<commit_message>
Fixing lec-24 slide mistake
</commit_message>
<xml_diff>
--- a/tyler/meena/cs220/f21/materials/lec_24_F21.pptx
+++ b/tyler/meena/cs220/f21/materials/lec_24_F21.pptx
@@ -2165,7 +2165,7 @@
           </a:ln>
           <a:extLst>
             <a:ext uri="{C572A759-6A51-4108-AA02-DFA0A04FC94B}">
-              <ma14:wrappingTextBoxFlag xmlns:ma14="http://schemas.microsoft.com/office/mac/drawingml/2011/main" xmlns:a14="http://schemas.microsoft.com/office/drawing/2010/main" xmlns:m="http://schemas.openxmlformats.org/officeDocument/2006/math" xmlns="" val="1"/>
+              <ma14:wrappingTextBoxFlag xmlns="" xmlns:m="http://schemas.openxmlformats.org/officeDocument/2006/math" xmlns:a14="http://schemas.microsoft.com/office/drawing/2010/main" xmlns:ma14="http://schemas.microsoft.com/office/mac/drawingml/2011/main" val="1"/>
             </a:ext>
           </a:extLst>
         </p:spPr>
@@ -2204,7 +2204,7 @@
           </a:ln>
           <a:extLst>
             <a:ext uri="{C572A759-6A51-4108-AA02-DFA0A04FC94B}">
-              <ma14:wrappingTextBoxFlag xmlns:ma14="http://schemas.microsoft.com/office/mac/drawingml/2011/main" xmlns:a14="http://schemas.microsoft.com/office/drawing/2010/main" xmlns:m="http://schemas.openxmlformats.org/officeDocument/2006/math" xmlns="" val="1"/>
+              <ma14:wrappingTextBoxFlag xmlns="" xmlns:m="http://schemas.openxmlformats.org/officeDocument/2006/math" xmlns:a14="http://schemas.microsoft.com/office/drawing/2010/main" xmlns:ma14="http://schemas.microsoft.com/office/mac/drawingml/2011/main" val="1"/>
             </a:ext>
           </a:extLst>
         </p:spPr>
@@ -3419,7 +3419,7 @@
           </a:ln>
           <a:extLst>
             <a:ext uri="{C572A759-6A51-4108-AA02-DFA0A04FC94B}">
-              <ma14:wrappingTextBoxFlag xmlns:ma14="http://schemas.microsoft.com/office/mac/drawingml/2011/main" xmlns:a14="http://schemas.microsoft.com/office/drawing/2010/main" xmlns:m="http://schemas.openxmlformats.org/officeDocument/2006/math" xmlns="" val="1"/>
+              <ma14:wrappingTextBoxFlag xmlns="" xmlns:m="http://schemas.openxmlformats.org/officeDocument/2006/math" xmlns:a14="http://schemas.microsoft.com/office/drawing/2010/main" xmlns:ma14="http://schemas.microsoft.com/office/mac/drawingml/2011/main" val="1"/>
             </a:ext>
           </a:extLst>
         </p:spPr>
@@ -3454,7 +3454,7 @@
           </a:ln>
           <a:extLst>
             <a:ext uri="{C572A759-6A51-4108-AA02-DFA0A04FC94B}">
-              <ma14:wrappingTextBoxFlag xmlns:ma14="http://schemas.microsoft.com/office/mac/drawingml/2011/main" xmlns:a14="http://schemas.microsoft.com/office/drawing/2010/main" xmlns:m="http://schemas.openxmlformats.org/officeDocument/2006/math" xmlns="" val="1"/>
+              <ma14:wrappingTextBoxFlag xmlns="" xmlns:m="http://schemas.openxmlformats.org/officeDocument/2006/math" xmlns:a14="http://schemas.microsoft.com/office/drawing/2010/main" xmlns:ma14="http://schemas.microsoft.com/office/mac/drawingml/2011/main" val="1"/>
             </a:ext>
           </a:extLst>
         </p:spPr>
@@ -3501,7 +3501,7 @@
           </a:ln>
           <a:extLst>
             <a:ext uri="{C572A759-6A51-4108-AA02-DFA0A04FC94B}">
-              <ma14:wrappingTextBoxFlag xmlns:ma14="http://schemas.microsoft.com/office/mac/drawingml/2011/main" xmlns:a14="http://schemas.microsoft.com/office/drawing/2010/main" xmlns:m="http://schemas.openxmlformats.org/officeDocument/2006/math" xmlns="" val="1"/>
+              <ma14:wrappingTextBoxFlag xmlns="" xmlns:m="http://schemas.openxmlformats.org/officeDocument/2006/math" xmlns:a14="http://schemas.microsoft.com/office/drawing/2010/main" xmlns:ma14="http://schemas.microsoft.com/office/mac/drawingml/2011/main" val="1"/>
             </a:ext>
           </a:extLst>
         </p:spPr>
@@ -3672,7 +3672,7 @@
           </a:ln>
           <a:extLst>
             <a:ext uri="{C572A759-6A51-4108-AA02-DFA0A04FC94B}">
-              <ma14:wrappingTextBoxFlag xmlns:ma14="http://schemas.microsoft.com/office/mac/drawingml/2011/main" xmlns:a14="http://schemas.microsoft.com/office/drawing/2010/main" xmlns:m="http://schemas.openxmlformats.org/officeDocument/2006/math" xmlns="" val="1"/>
+              <ma14:wrappingTextBoxFlag xmlns="" xmlns:m="http://schemas.openxmlformats.org/officeDocument/2006/math" xmlns:a14="http://schemas.microsoft.com/office/drawing/2010/main" xmlns:ma14="http://schemas.microsoft.com/office/mac/drawingml/2011/main" val="1"/>
             </a:ext>
           </a:extLst>
         </p:spPr>
@@ -3717,7 +3717,7 @@
           </a:ln>
           <a:extLst>
             <a:ext uri="{C572A759-6A51-4108-AA02-DFA0A04FC94B}">
-              <ma14:wrappingTextBoxFlag xmlns:ma14="http://schemas.microsoft.com/office/mac/drawingml/2011/main" xmlns:a14="http://schemas.microsoft.com/office/drawing/2010/main" xmlns:m="http://schemas.openxmlformats.org/officeDocument/2006/math" xmlns="" val="1"/>
+              <ma14:wrappingTextBoxFlag xmlns="" xmlns:m="http://schemas.openxmlformats.org/officeDocument/2006/math" xmlns:a14="http://schemas.microsoft.com/office/drawing/2010/main" xmlns:ma14="http://schemas.microsoft.com/office/mac/drawingml/2011/main" val="1"/>
             </a:ext>
           </a:extLst>
         </p:spPr>
@@ -3762,7 +3762,7 @@
           </a:ln>
           <a:extLst>
             <a:ext uri="{C572A759-6A51-4108-AA02-DFA0A04FC94B}">
-              <ma14:wrappingTextBoxFlag xmlns:ma14="http://schemas.microsoft.com/office/mac/drawingml/2011/main" xmlns:a14="http://schemas.microsoft.com/office/drawing/2010/main" xmlns:m="http://schemas.openxmlformats.org/officeDocument/2006/math" xmlns="" val="1"/>
+              <ma14:wrappingTextBoxFlag xmlns="" xmlns:m="http://schemas.openxmlformats.org/officeDocument/2006/math" xmlns:a14="http://schemas.microsoft.com/office/drawing/2010/main" xmlns:ma14="http://schemas.microsoft.com/office/mac/drawingml/2011/main" val="1"/>
             </a:ext>
           </a:extLst>
         </p:spPr>
@@ -3928,7 +3928,7 @@
           </a:ln>
           <a:extLst>
             <a:ext uri="{C572A759-6A51-4108-AA02-DFA0A04FC94B}">
-              <ma14:wrappingTextBoxFlag xmlns:ma14="http://schemas.microsoft.com/office/mac/drawingml/2011/main" xmlns:a14="http://schemas.microsoft.com/office/drawing/2010/main" xmlns:m="http://schemas.openxmlformats.org/officeDocument/2006/math" xmlns="" val="1"/>
+              <ma14:wrappingTextBoxFlag xmlns="" xmlns:m="http://schemas.openxmlformats.org/officeDocument/2006/math" xmlns:a14="http://schemas.microsoft.com/office/drawing/2010/main" xmlns:ma14="http://schemas.microsoft.com/office/mac/drawingml/2011/main" val="1"/>
             </a:ext>
           </a:extLst>
         </p:spPr>
@@ -3979,7 +3979,7 @@
           </a:ln>
           <a:extLst>
             <a:ext uri="{C572A759-6A51-4108-AA02-DFA0A04FC94B}">
-              <ma14:wrappingTextBoxFlag xmlns:ma14="http://schemas.microsoft.com/office/mac/drawingml/2011/main" xmlns:a14="http://schemas.microsoft.com/office/drawing/2010/main" xmlns:m="http://schemas.openxmlformats.org/officeDocument/2006/math" xmlns="" val="1"/>
+              <ma14:wrappingTextBoxFlag xmlns="" xmlns:m="http://schemas.openxmlformats.org/officeDocument/2006/math" xmlns:a14="http://schemas.microsoft.com/office/drawing/2010/main" xmlns:ma14="http://schemas.microsoft.com/office/mac/drawingml/2011/main" val="1"/>
             </a:ext>
           </a:extLst>
         </p:spPr>
@@ -4030,7 +4030,7 @@
           </a:ln>
           <a:extLst>
             <a:ext uri="{C572A759-6A51-4108-AA02-DFA0A04FC94B}">
-              <ma14:wrappingTextBoxFlag xmlns:ma14="http://schemas.microsoft.com/office/mac/drawingml/2011/main" xmlns:a14="http://schemas.microsoft.com/office/drawing/2010/main" xmlns:m="http://schemas.openxmlformats.org/officeDocument/2006/math" xmlns="" val="1"/>
+              <ma14:wrappingTextBoxFlag xmlns="" xmlns:m="http://schemas.openxmlformats.org/officeDocument/2006/math" xmlns:a14="http://schemas.microsoft.com/office/drawing/2010/main" xmlns:ma14="http://schemas.microsoft.com/office/mac/drawingml/2011/main" val="1"/>
             </a:ext>
           </a:extLst>
         </p:spPr>
@@ -4095,7 +4095,7 @@
           </a:ln>
           <a:extLst>
             <a:ext uri="{C572A759-6A51-4108-AA02-DFA0A04FC94B}">
-              <ma14:wrappingTextBoxFlag xmlns:ma14="http://schemas.microsoft.com/office/mac/drawingml/2011/main" xmlns:a14="http://schemas.microsoft.com/office/drawing/2010/main" xmlns:m="http://schemas.openxmlformats.org/officeDocument/2006/math" xmlns="" val="1"/>
+              <ma14:wrappingTextBoxFlag xmlns="" xmlns:m="http://schemas.openxmlformats.org/officeDocument/2006/math" xmlns:a14="http://schemas.microsoft.com/office/drawing/2010/main" xmlns:ma14="http://schemas.microsoft.com/office/mac/drawingml/2011/main" val="1"/>
             </a:ext>
           </a:extLst>
         </p:spPr>
@@ -4495,7 +4495,7 @@
           </a:ln>
           <a:extLst>
             <a:ext uri="{C572A759-6A51-4108-AA02-DFA0A04FC94B}">
-              <ma14:wrappingTextBoxFlag xmlns:ma14="http://schemas.microsoft.com/office/mac/drawingml/2011/main" xmlns:a14="http://schemas.microsoft.com/office/drawing/2010/main" xmlns:m="http://schemas.openxmlformats.org/officeDocument/2006/math" xmlns="" val="1"/>
+              <ma14:wrappingTextBoxFlag xmlns="" xmlns:m="http://schemas.openxmlformats.org/officeDocument/2006/math" xmlns:a14="http://schemas.microsoft.com/office/drawing/2010/main" xmlns:ma14="http://schemas.microsoft.com/office/mac/drawingml/2011/main" val="1"/>
             </a:ext>
           </a:extLst>
         </p:spPr>
@@ -4637,7 +4637,7 @@
           </a:ln>
           <a:extLst>
             <a:ext uri="{C572A759-6A51-4108-AA02-DFA0A04FC94B}">
-              <ma14:wrappingTextBoxFlag xmlns:ma14="http://schemas.microsoft.com/office/mac/drawingml/2011/main" xmlns:a14="http://schemas.microsoft.com/office/drawing/2010/main" xmlns:m="http://schemas.openxmlformats.org/officeDocument/2006/math" xmlns="" val="1"/>
+              <ma14:wrappingTextBoxFlag xmlns="" xmlns:m="http://schemas.openxmlformats.org/officeDocument/2006/math" xmlns:a14="http://schemas.microsoft.com/office/drawing/2010/main" xmlns:ma14="http://schemas.microsoft.com/office/mac/drawingml/2011/main" val="1"/>
             </a:ext>
           </a:extLst>
         </p:spPr>
@@ -4672,7 +4672,7 @@
           </a:ln>
           <a:extLst>
             <a:ext uri="{C572A759-6A51-4108-AA02-DFA0A04FC94B}">
-              <ma14:wrappingTextBoxFlag xmlns:ma14="http://schemas.microsoft.com/office/mac/drawingml/2011/main" xmlns:a14="http://schemas.microsoft.com/office/drawing/2010/main" xmlns:m="http://schemas.openxmlformats.org/officeDocument/2006/math" xmlns="" val="1"/>
+              <ma14:wrappingTextBoxFlag xmlns="" xmlns:m="http://schemas.openxmlformats.org/officeDocument/2006/math" xmlns:a14="http://schemas.microsoft.com/office/drawing/2010/main" xmlns:ma14="http://schemas.microsoft.com/office/mac/drawingml/2011/main" val="1"/>
             </a:ext>
           </a:extLst>
         </p:spPr>
@@ -4719,7 +4719,7 @@
           </a:ln>
           <a:extLst>
             <a:ext uri="{C572A759-6A51-4108-AA02-DFA0A04FC94B}">
-              <ma14:wrappingTextBoxFlag xmlns:ma14="http://schemas.microsoft.com/office/mac/drawingml/2011/main" xmlns:a14="http://schemas.microsoft.com/office/drawing/2010/main" xmlns:m="http://schemas.openxmlformats.org/officeDocument/2006/math" xmlns="" val="1"/>
+              <ma14:wrappingTextBoxFlag xmlns="" xmlns:m="http://schemas.openxmlformats.org/officeDocument/2006/math" xmlns:a14="http://schemas.microsoft.com/office/drawing/2010/main" xmlns:ma14="http://schemas.microsoft.com/office/mac/drawingml/2011/main" val="1"/>
             </a:ext>
           </a:extLst>
         </p:spPr>
@@ -4813,7 +4813,7 @@
           </a:ln>
           <a:extLst>
             <a:ext uri="{C572A759-6A51-4108-AA02-DFA0A04FC94B}">
-              <ma14:wrappingTextBoxFlag xmlns:ma14="http://schemas.microsoft.com/office/mac/drawingml/2011/main" xmlns:a14="http://schemas.microsoft.com/office/drawing/2010/main" xmlns:m="http://schemas.openxmlformats.org/officeDocument/2006/math" xmlns="" val="1"/>
+              <ma14:wrappingTextBoxFlag xmlns="" xmlns:m="http://schemas.openxmlformats.org/officeDocument/2006/math" xmlns:a14="http://schemas.microsoft.com/office/drawing/2010/main" xmlns:ma14="http://schemas.microsoft.com/office/mac/drawingml/2011/main" val="1"/>
             </a:ext>
           </a:extLst>
         </p:spPr>
@@ -4975,7 +4975,7 @@
           </a:ln>
           <a:extLst>
             <a:ext uri="{C572A759-6A51-4108-AA02-DFA0A04FC94B}">
-              <ma14:wrappingTextBoxFlag xmlns:ma14="http://schemas.microsoft.com/office/mac/drawingml/2011/main" xmlns:a14="http://schemas.microsoft.com/office/drawing/2010/main" xmlns:m="http://schemas.openxmlformats.org/officeDocument/2006/math" xmlns="" val="1"/>
+              <ma14:wrappingTextBoxFlag xmlns="" xmlns:m="http://schemas.openxmlformats.org/officeDocument/2006/math" xmlns:a14="http://schemas.microsoft.com/office/drawing/2010/main" xmlns:ma14="http://schemas.microsoft.com/office/mac/drawingml/2011/main" val="1"/>
             </a:ext>
           </a:extLst>
         </p:spPr>
@@ -5023,7 +5023,7 @@
           </a:ln>
           <a:extLst>
             <a:ext uri="{C572A759-6A51-4108-AA02-DFA0A04FC94B}">
-              <ma14:wrappingTextBoxFlag xmlns:ma14="http://schemas.microsoft.com/office/mac/drawingml/2011/main" xmlns:a14="http://schemas.microsoft.com/office/drawing/2010/main" xmlns:m="http://schemas.openxmlformats.org/officeDocument/2006/math" xmlns="" val="1"/>
+              <ma14:wrappingTextBoxFlag xmlns="" xmlns:m="http://schemas.openxmlformats.org/officeDocument/2006/math" xmlns:a14="http://schemas.microsoft.com/office/drawing/2010/main" xmlns:ma14="http://schemas.microsoft.com/office/mac/drawingml/2011/main" val="1"/>
             </a:ext>
           </a:extLst>
         </p:spPr>
@@ -5068,7 +5068,7 @@
           </a:ln>
           <a:extLst>
             <a:ext uri="{C572A759-6A51-4108-AA02-DFA0A04FC94B}">
-              <ma14:wrappingTextBoxFlag xmlns:ma14="http://schemas.microsoft.com/office/mac/drawingml/2011/main" xmlns:a14="http://schemas.microsoft.com/office/drawing/2010/main" xmlns:m="http://schemas.openxmlformats.org/officeDocument/2006/math" xmlns="" val="1"/>
+              <ma14:wrappingTextBoxFlag xmlns="" xmlns:m="http://schemas.openxmlformats.org/officeDocument/2006/math" xmlns:a14="http://schemas.microsoft.com/office/drawing/2010/main" xmlns:ma14="http://schemas.microsoft.com/office/mac/drawingml/2011/main" val="1"/>
             </a:ext>
           </a:extLst>
         </p:spPr>
@@ -5113,7 +5113,7 @@
           </a:ln>
           <a:extLst>
             <a:ext uri="{C572A759-6A51-4108-AA02-DFA0A04FC94B}">
-              <ma14:wrappingTextBoxFlag xmlns:ma14="http://schemas.microsoft.com/office/mac/drawingml/2011/main" xmlns:a14="http://schemas.microsoft.com/office/drawing/2010/main" xmlns:m="http://schemas.openxmlformats.org/officeDocument/2006/math" xmlns="" val="1"/>
+              <ma14:wrappingTextBoxFlag xmlns="" xmlns:m="http://schemas.openxmlformats.org/officeDocument/2006/math" xmlns:a14="http://schemas.microsoft.com/office/drawing/2010/main" xmlns:ma14="http://schemas.microsoft.com/office/mac/drawingml/2011/main" val="1"/>
             </a:ext>
           </a:extLst>
         </p:spPr>
@@ -5338,7 +5338,7 @@
           </a:ln>
           <a:extLst>
             <a:ext uri="{C572A759-6A51-4108-AA02-DFA0A04FC94B}">
-              <ma14:wrappingTextBoxFlag xmlns:ma14="http://schemas.microsoft.com/office/mac/drawingml/2011/main" xmlns:a14="http://schemas.microsoft.com/office/drawing/2010/main" xmlns:m="http://schemas.openxmlformats.org/officeDocument/2006/math" xmlns="" val="1"/>
+              <ma14:wrappingTextBoxFlag xmlns="" xmlns:m="http://schemas.openxmlformats.org/officeDocument/2006/math" xmlns:a14="http://schemas.microsoft.com/office/drawing/2010/main" xmlns:ma14="http://schemas.microsoft.com/office/mac/drawingml/2011/main" val="1"/>
             </a:ext>
           </a:extLst>
         </p:spPr>
@@ -5389,7 +5389,7 @@
           </a:ln>
           <a:extLst>
             <a:ext uri="{C572A759-6A51-4108-AA02-DFA0A04FC94B}">
-              <ma14:wrappingTextBoxFlag xmlns:ma14="http://schemas.microsoft.com/office/mac/drawingml/2011/main" xmlns:a14="http://schemas.microsoft.com/office/drawing/2010/main" xmlns:m="http://schemas.openxmlformats.org/officeDocument/2006/math" xmlns="" val="1"/>
+              <ma14:wrappingTextBoxFlag xmlns="" xmlns:m="http://schemas.openxmlformats.org/officeDocument/2006/math" xmlns:a14="http://schemas.microsoft.com/office/drawing/2010/main" xmlns:ma14="http://schemas.microsoft.com/office/mac/drawingml/2011/main" val="1"/>
             </a:ext>
           </a:extLst>
         </p:spPr>
@@ -5440,7 +5440,7 @@
           </a:ln>
           <a:extLst>
             <a:ext uri="{C572A759-6A51-4108-AA02-DFA0A04FC94B}">
-              <ma14:wrappingTextBoxFlag xmlns:ma14="http://schemas.microsoft.com/office/mac/drawingml/2011/main" xmlns:a14="http://schemas.microsoft.com/office/drawing/2010/main" xmlns:m="http://schemas.openxmlformats.org/officeDocument/2006/math" xmlns="" val="1"/>
+              <ma14:wrappingTextBoxFlag xmlns="" xmlns:m="http://schemas.openxmlformats.org/officeDocument/2006/math" xmlns:a14="http://schemas.microsoft.com/office/drawing/2010/main" xmlns:ma14="http://schemas.microsoft.com/office/mac/drawingml/2011/main" val="1"/>
             </a:ext>
           </a:extLst>
         </p:spPr>
@@ -5486,7 +5486,7 @@
           </a:ln>
           <a:extLst>
             <a:ext uri="{C572A759-6A51-4108-AA02-DFA0A04FC94B}">
-              <ma14:wrappingTextBoxFlag xmlns:ma14="http://schemas.microsoft.com/office/mac/drawingml/2011/main" xmlns:a14="http://schemas.microsoft.com/office/drawing/2010/main" xmlns:m="http://schemas.openxmlformats.org/officeDocument/2006/math" xmlns="" val="1"/>
+              <ma14:wrappingTextBoxFlag xmlns="" xmlns:m="http://schemas.openxmlformats.org/officeDocument/2006/math" xmlns:a14="http://schemas.microsoft.com/office/drawing/2010/main" xmlns:ma14="http://schemas.microsoft.com/office/mac/drawingml/2011/main" val="1"/>
             </a:ext>
           </a:extLst>
         </p:spPr>
@@ -5551,7 +5551,7 @@
           </a:ln>
           <a:extLst>
             <a:ext uri="{C572A759-6A51-4108-AA02-DFA0A04FC94B}">
-              <ma14:wrappingTextBoxFlag xmlns:ma14="http://schemas.microsoft.com/office/mac/drawingml/2011/main" xmlns:a14="http://schemas.microsoft.com/office/drawing/2010/main" xmlns:m="http://schemas.openxmlformats.org/officeDocument/2006/math" xmlns="" val="1"/>
+              <ma14:wrappingTextBoxFlag xmlns="" xmlns:m="http://schemas.openxmlformats.org/officeDocument/2006/math" xmlns:a14="http://schemas.microsoft.com/office/drawing/2010/main" xmlns:ma14="http://schemas.microsoft.com/office/mac/drawingml/2011/main" val="1"/>
             </a:ext>
           </a:extLst>
         </p:spPr>
@@ -5951,7 +5951,7 @@
           </a:ln>
           <a:extLst>
             <a:ext uri="{C572A759-6A51-4108-AA02-DFA0A04FC94B}">
-              <ma14:wrappingTextBoxFlag xmlns:ma14="http://schemas.microsoft.com/office/mac/drawingml/2011/main" xmlns:a14="http://schemas.microsoft.com/office/drawing/2010/main" xmlns:m="http://schemas.openxmlformats.org/officeDocument/2006/math" xmlns="" val="1"/>
+              <ma14:wrappingTextBoxFlag xmlns="" xmlns:m="http://schemas.openxmlformats.org/officeDocument/2006/math" xmlns:a14="http://schemas.microsoft.com/office/drawing/2010/main" xmlns:ma14="http://schemas.microsoft.com/office/mac/drawingml/2011/main" val="1"/>
             </a:ext>
           </a:extLst>
         </p:spPr>
@@ -6093,7 +6093,7 @@
           </a:ln>
           <a:extLst>
             <a:ext uri="{C572A759-6A51-4108-AA02-DFA0A04FC94B}">
-              <ma14:wrappingTextBoxFlag xmlns:ma14="http://schemas.microsoft.com/office/mac/drawingml/2011/main" xmlns:a14="http://schemas.microsoft.com/office/drawing/2010/main" xmlns:m="http://schemas.openxmlformats.org/officeDocument/2006/math" xmlns="" val="1"/>
+              <ma14:wrappingTextBoxFlag xmlns="" xmlns:m="http://schemas.openxmlformats.org/officeDocument/2006/math" xmlns:a14="http://schemas.microsoft.com/office/drawing/2010/main" xmlns:ma14="http://schemas.microsoft.com/office/mac/drawingml/2011/main" val="1"/>
             </a:ext>
           </a:extLst>
         </p:spPr>
@@ -6128,7 +6128,7 @@
           </a:ln>
           <a:extLst>
             <a:ext uri="{C572A759-6A51-4108-AA02-DFA0A04FC94B}">
-              <ma14:wrappingTextBoxFlag xmlns:ma14="http://schemas.microsoft.com/office/mac/drawingml/2011/main" xmlns:a14="http://schemas.microsoft.com/office/drawing/2010/main" xmlns:m="http://schemas.openxmlformats.org/officeDocument/2006/math" xmlns="" val="1"/>
+              <ma14:wrappingTextBoxFlag xmlns="" xmlns:m="http://schemas.openxmlformats.org/officeDocument/2006/math" xmlns:a14="http://schemas.microsoft.com/office/drawing/2010/main" xmlns:ma14="http://schemas.microsoft.com/office/mac/drawingml/2011/main" val="1"/>
             </a:ext>
           </a:extLst>
         </p:spPr>
@@ -6175,7 +6175,7 @@
           </a:ln>
           <a:extLst>
             <a:ext uri="{C572A759-6A51-4108-AA02-DFA0A04FC94B}">
-              <ma14:wrappingTextBoxFlag xmlns:ma14="http://schemas.microsoft.com/office/mac/drawingml/2011/main" xmlns:a14="http://schemas.microsoft.com/office/drawing/2010/main" xmlns:m="http://schemas.openxmlformats.org/officeDocument/2006/math" xmlns="" val="1"/>
+              <ma14:wrappingTextBoxFlag xmlns="" xmlns:m="http://schemas.openxmlformats.org/officeDocument/2006/math" xmlns:a14="http://schemas.microsoft.com/office/drawing/2010/main" xmlns:ma14="http://schemas.microsoft.com/office/mac/drawingml/2011/main" val="1"/>
             </a:ext>
           </a:extLst>
         </p:spPr>
@@ -6269,7 +6269,7 @@
           </a:ln>
           <a:extLst>
             <a:ext uri="{C572A759-6A51-4108-AA02-DFA0A04FC94B}">
-              <ma14:wrappingTextBoxFlag xmlns:ma14="http://schemas.microsoft.com/office/mac/drawingml/2011/main" xmlns:a14="http://schemas.microsoft.com/office/drawing/2010/main" xmlns:m="http://schemas.openxmlformats.org/officeDocument/2006/math" xmlns="" val="1"/>
+              <ma14:wrappingTextBoxFlag xmlns="" xmlns:m="http://schemas.openxmlformats.org/officeDocument/2006/math" xmlns:a14="http://schemas.microsoft.com/office/drawing/2010/main" xmlns:ma14="http://schemas.microsoft.com/office/mac/drawingml/2011/main" val="1"/>
             </a:ext>
           </a:extLst>
         </p:spPr>
@@ -6431,7 +6431,7 @@
           </a:ln>
           <a:extLst>
             <a:ext uri="{C572A759-6A51-4108-AA02-DFA0A04FC94B}">
-              <ma14:wrappingTextBoxFlag xmlns:ma14="http://schemas.microsoft.com/office/mac/drawingml/2011/main" xmlns:a14="http://schemas.microsoft.com/office/drawing/2010/main" xmlns:m="http://schemas.openxmlformats.org/officeDocument/2006/math" xmlns="" val="1"/>
+              <ma14:wrappingTextBoxFlag xmlns="" xmlns:m="http://schemas.openxmlformats.org/officeDocument/2006/math" xmlns:a14="http://schemas.microsoft.com/office/drawing/2010/main" xmlns:ma14="http://schemas.microsoft.com/office/mac/drawingml/2011/main" val="1"/>
             </a:ext>
           </a:extLst>
         </p:spPr>
@@ -6479,7 +6479,7 @@
           </a:ln>
           <a:extLst>
             <a:ext uri="{C572A759-6A51-4108-AA02-DFA0A04FC94B}">
-              <ma14:wrappingTextBoxFlag xmlns:ma14="http://schemas.microsoft.com/office/mac/drawingml/2011/main" xmlns:a14="http://schemas.microsoft.com/office/drawing/2010/main" xmlns:m="http://schemas.openxmlformats.org/officeDocument/2006/math" xmlns="" val="1"/>
+              <ma14:wrappingTextBoxFlag xmlns="" xmlns:m="http://schemas.openxmlformats.org/officeDocument/2006/math" xmlns:a14="http://schemas.microsoft.com/office/drawing/2010/main" xmlns:ma14="http://schemas.microsoft.com/office/mac/drawingml/2011/main" val="1"/>
             </a:ext>
           </a:extLst>
         </p:spPr>
@@ -6524,7 +6524,7 @@
           </a:ln>
           <a:extLst>
             <a:ext uri="{C572A759-6A51-4108-AA02-DFA0A04FC94B}">
-              <ma14:wrappingTextBoxFlag xmlns:ma14="http://schemas.microsoft.com/office/mac/drawingml/2011/main" xmlns:a14="http://schemas.microsoft.com/office/drawing/2010/main" xmlns:m="http://schemas.openxmlformats.org/officeDocument/2006/math" xmlns="" val="1"/>
+              <ma14:wrappingTextBoxFlag xmlns="" xmlns:m="http://schemas.openxmlformats.org/officeDocument/2006/math" xmlns:a14="http://schemas.microsoft.com/office/drawing/2010/main" xmlns:ma14="http://schemas.microsoft.com/office/mac/drawingml/2011/main" val="1"/>
             </a:ext>
           </a:extLst>
         </p:spPr>
@@ -6569,7 +6569,7 @@
           </a:ln>
           <a:extLst>
             <a:ext uri="{C572A759-6A51-4108-AA02-DFA0A04FC94B}">
-              <ma14:wrappingTextBoxFlag xmlns:ma14="http://schemas.microsoft.com/office/mac/drawingml/2011/main" xmlns:a14="http://schemas.microsoft.com/office/drawing/2010/main" xmlns:m="http://schemas.openxmlformats.org/officeDocument/2006/math" xmlns="" val="1"/>
+              <ma14:wrappingTextBoxFlag xmlns="" xmlns:m="http://schemas.openxmlformats.org/officeDocument/2006/math" xmlns:a14="http://schemas.microsoft.com/office/drawing/2010/main" xmlns:ma14="http://schemas.microsoft.com/office/mac/drawingml/2011/main" val="1"/>
             </a:ext>
           </a:extLst>
         </p:spPr>
@@ -6794,7 +6794,7 @@
           </a:ln>
           <a:extLst>
             <a:ext uri="{C572A759-6A51-4108-AA02-DFA0A04FC94B}">
-              <ma14:wrappingTextBoxFlag xmlns:ma14="http://schemas.microsoft.com/office/mac/drawingml/2011/main" xmlns:a14="http://schemas.microsoft.com/office/drawing/2010/main" xmlns:m="http://schemas.openxmlformats.org/officeDocument/2006/math" xmlns="" val="1"/>
+              <ma14:wrappingTextBoxFlag xmlns="" xmlns:m="http://schemas.openxmlformats.org/officeDocument/2006/math" xmlns:a14="http://schemas.microsoft.com/office/drawing/2010/main" xmlns:ma14="http://schemas.microsoft.com/office/mac/drawingml/2011/main" val="1"/>
             </a:ext>
           </a:extLst>
         </p:spPr>
@@ -6845,7 +6845,7 @@
           </a:ln>
           <a:extLst>
             <a:ext uri="{C572A759-6A51-4108-AA02-DFA0A04FC94B}">
-              <ma14:wrappingTextBoxFlag xmlns:ma14="http://schemas.microsoft.com/office/mac/drawingml/2011/main" xmlns:a14="http://schemas.microsoft.com/office/drawing/2010/main" xmlns:m="http://schemas.openxmlformats.org/officeDocument/2006/math" xmlns="" val="1"/>
+              <ma14:wrappingTextBoxFlag xmlns="" xmlns:m="http://schemas.openxmlformats.org/officeDocument/2006/math" xmlns:a14="http://schemas.microsoft.com/office/drawing/2010/main" xmlns:ma14="http://schemas.microsoft.com/office/mac/drawingml/2011/main" val="1"/>
             </a:ext>
           </a:extLst>
         </p:spPr>
@@ -6896,7 +6896,7 @@
           </a:ln>
           <a:extLst>
             <a:ext uri="{C572A759-6A51-4108-AA02-DFA0A04FC94B}">
-              <ma14:wrappingTextBoxFlag xmlns:ma14="http://schemas.microsoft.com/office/mac/drawingml/2011/main" xmlns:a14="http://schemas.microsoft.com/office/drawing/2010/main" xmlns:m="http://schemas.openxmlformats.org/officeDocument/2006/math" xmlns="" val="1"/>
+              <ma14:wrappingTextBoxFlag xmlns="" xmlns:m="http://schemas.openxmlformats.org/officeDocument/2006/math" xmlns:a14="http://schemas.microsoft.com/office/drawing/2010/main" xmlns:ma14="http://schemas.microsoft.com/office/mac/drawingml/2011/main" val="1"/>
             </a:ext>
           </a:extLst>
         </p:spPr>
@@ -6942,7 +6942,7 @@
           </a:ln>
           <a:extLst>
             <a:ext uri="{C572A759-6A51-4108-AA02-DFA0A04FC94B}">
-              <ma14:wrappingTextBoxFlag xmlns:ma14="http://schemas.microsoft.com/office/mac/drawingml/2011/main" xmlns:a14="http://schemas.microsoft.com/office/drawing/2010/main" xmlns:m="http://schemas.openxmlformats.org/officeDocument/2006/math" xmlns="" val="1"/>
+              <ma14:wrappingTextBoxFlag xmlns="" xmlns:m="http://schemas.openxmlformats.org/officeDocument/2006/math" xmlns:a14="http://schemas.microsoft.com/office/drawing/2010/main" xmlns:ma14="http://schemas.microsoft.com/office/mac/drawingml/2011/main" val="1"/>
             </a:ext>
           </a:extLst>
         </p:spPr>
@@ -7342,7 +7342,7 @@
           </a:ln>
           <a:extLst>
             <a:ext uri="{C572A759-6A51-4108-AA02-DFA0A04FC94B}">
-              <ma14:wrappingTextBoxFlag xmlns:ma14="http://schemas.microsoft.com/office/mac/drawingml/2011/main" xmlns:a14="http://schemas.microsoft.com/office/drawing/2010/main" xmlns:m="http://schemas.openxmlformats.org/officeDocument/2006/math" xmlns="" val="1"/>
+              <ma14:wrappingTextBoxFlag xmlns="" xmlns:m="http://schemas.openxmlformats.org/officeDocument/2006/math" xmlns:a14="http://schemas.microsoft.com/office/drawing/2010/main" xmlns:ma14="http://schemas.microsoft.com/office/mac/drawingml/2011/main" val="1"/>
             </a:ext>
           </a:extLst>
         </p:spPr>
@@ -7407,7 +7407,7 @@
           </a:ln>
           <a:extLst>
             <a:ext uri="{C572A759-6A51-4108-AA02-DFA0A04FC94B}">
-              <ma14:wrappingTextBoxFlag xmlns:ma14="http://schemas.microsoft.com/office/mac/drawingml/2011/main" xmlns:a14="http://schemas.microsoft.com/office/drawing/2010/main" xmlns:m="http://schemas.openxmlformats.org/officeDocument/2006/math" xmlns="" val="1"/>
+              <ma14:wrappingTextBoxFlag xmlns="" xmlns:m="http://schemas.openxmlformats.org/officeDocument/2006/math" xmlns:a14="http://schemas.microsoft.com/office/drawing/2010/main" xmlns:ma14="http://schemas.microsoft.com/office/mac/drawingml/2011/main" val="1"/>
             </a:ext>
           </a:extLst>
         </p:spPr>
@@ -7549,7 +7549,7 @@
           </a:ln>
           <a:extLst>
             <a:ext uri="{C572A759-6A51-4108-AA02-DFA0A04FC94B}">
-              <ma14:wrappingTextBoxFlag xmlns:ma14="http://schemas.microsoft.com/office/mac/drawingml/2011/main" xmlns:a14="http://schemas.microsoft.com/office/drawing/2010/main" xmlns:m="http://schemas.openxmlformats.org/officeDocument/2006/math" xmlns="" val="1"/>
+              <ma14:wrappingTextBoxFlag xmlns="" xmlns:m="http://schemas.openxmlformats.org/officeDocument/2006/math" xmlns:a14="http://schemas.microsoft.com/office/drawing/2010/main" xmlns:ma14="http://schemas.microsoft.com/office/mac/drawingml/2011/main" val="1"/>
             </a:ext>
           </a:extLst>
         </p:spPr>
@@ -7584,7 +7584,7 @@
           </a:ln>
           <a:extLst>
             <a:ext uri="{C572A759-6A51-4108-AA02-DFA0A04FC94B}">
-              <ma14:wrappingTextBoxFlag xmlns:ma14="http://schemas.microsoft.com/office/mac/drawingml/2011/main" xmlns:a14="http://schemas.microsoft.com/office/drawing/2010/main" xmlns:m="http://schemas.openxmlformats.org/officeDocument/2006/math" xmlns="" val="1"/>
+              <ma14:wrappingTextBoxFlag xmlns="" xmlns:m="http://schemas.openxmlformats.org/officeDocument/2006/math" xmlns:a14="http://schemas.microsoft.com/office/drawing/2010/main" xmlns:ma14="http://schemas.microsoft.com/office/mac/drawingml/2011/main" val="1"/>
             </a:ext>
           </a:extLst>
         </p:spPr>
@@ -7631,7 +7631,7 @@
           </a:ln>
           <a:extLst>
             <a:ext uri="{C572A759-6A51-4108-AA02-DFA0A04FC94B}">
-              <ma14:wrappingTextBoxFlag xmlns:ma14="http://schemas.microsoft.com/office/mac/drawingml/2011/main" xmlns:a14="http://schemas.microsoft.com/office/drawing/2010/main" xmlns:m="http://schemas.openxmlformats.org/officeDocument/2006/math" xmlns="" val="1"/>
+              <ma14:wrappingTextBoxFlag xmlns="" xmlns:m="http://schemas.openxmlformats.org/officeDocument/2006/math" xmlns:a14="http://schemas.microsoft.com/office/drawing/2010/main" xmlns:ma14="http://schemas.microsoft.com/office/mac/drawingml/2011/main" val="1"/>
             </a:ext>
           </a:extLst>
         </p:spPr>
@@ -7725,7 +7725,7 @@
           </a:ln>
           <a:extLst>
             <a:ext uri="{C572A759-6A51-4108-AA02-DFA0A04FC94B}">
-              <ma14:wrappingTextBoxFlag xmlns:ma14="http://schemas.microsoft.com/office/mac/drawingml/2011/main" xmlns:a14="http://schemas.microsoft.com/office/drawing/2010/main" xmlns:m="http://schemas.openxmlformats.org/officeDocument/2006/math" xmlns="" val="1"/>
+              <ma14:wrappingTextBoxFlag xmlns="" xmlns:m="http://schemas.openxmlformats.org/officeDocument/2006/math" xmlns:a14="http://schemas.microsoft.com/office/drawing/2010/main" xmlns:ma14="http://schemas.microsoft.com/office/mac/drawingml/2011/main" val="1"/>
             </a:ext>
           </a:extLst>
         </p:spPr>
@@ -7771,7 +7771,7 @@
           </a:ln>
           <a:extLst>
             <a:ext uri="{C572A759-6A51-4108-AA02-DFA0A04FC94B}">
-              <ma14:wrappingTextBoxFlag xmlns:ma14="http://schemas.microsoft.com/office/mac/drawingml/2011/main" xmlns:a14="http://schemas.microsoft.com/office/drawing/2010/main" xmlns:m="http://schemas.openxmlformats.org/officeDocument/2006/math" xmlns="" val="1"/>
+              <ma14:wrappingTextBoxFlag xmlns="" xmlns:m="http://schemas.openxmlformats.org/officeDocument/2006/math" xmlns:a14="http://schemas.microsoft.com/office/drawing/2010/main" xmlns:ma14="http://schemas.microsoft.com/office/mac/drawingml/2011/main" val="1"/>
             </a:ext>
           </a:extLst>
         </p:spPr>
@@ -7970,7 +7970,7 @@
           </a:ln>
           <a:extLst>
             <a:ext uri="{C572A759-6A51-4108-AA02-DFA0A04FC94B}">
-              <ma14:wrappingTextBoxFlag xmlns:ma14="http://schemas.microsoft.com/office/mac/drawingml/2011/main" xmlns:a14="http://schemas.microsoft.com/office/drawing/2010/main" xmlns:m="http://schemas.openxmlformats.org/officeDocument/2006/math" xmlns="" val="1"/>
+              <ma14:wrappingTextBoxFlag xmlns="" xmlns:m="http://schemas.openxmlformats.org/officeDocument/2006/math" xmlns:a14="http://schemas.microsoft.com/office/drawing/2010/main" xmlns:ma14="http://schemas.microsoft.com/office/mac/drawingml/2011/main" val="1"/>
             </a:ext>
           </a:extLst>
         </p:spPr>
@@ -8018,7 +8018,7 @@
           </a:ln>
           <a:extLst>
             <a:ext uri="{C572A759-6A51-4108-AA02-DFA0A04FC94B}">
-              <ma14:wrappingTextBoxFlag xmlns:ma14="http://schemas.microsoft.com/office/mac/drawingml/2011/main" xmlns:a14="http://schemas.microsoft.com/office/drawing/2010/main" xmlns:m="http://schemas.openxmlformats.org/officeDocument/2006/math" xmlns="" val="1"/>
+              <ma14:wrappingTextBoxFlag xmlns="" xmlns:m="http://schemas.openxmlformats.org/officeDocument/2006/math" xmlns:a14="http://schemas.microsoft.com/office/drawing/2010/main" xmlns:ma14="http://schemas.microsoft.com/office/mac/drawingml/2011/main" val="1"/>
             </a:ext>
           </a:extLst>
         </p:spPr>
@@ -8063,7 +8063,7 @@
           </a:ln>
           <a:extLst>
             <a:ext uri="{C572A759-6A51-4108-AA02-DFA0A04FC94B}">
-              <ma14:wrappingTextBoxFlag xmlns:ma14="http://schemas.microsoft.com/office/mac/drawingml/2011/main" xmlns:a14="http://schemas.microsoft.com/office/drawing/2010/main" xmlns:m="http://schemas.openxmlformats.org/officeDocument/2006/math" xmlns="" val="1"/>
+              <ma14:wrappingTextBoxFlag xmlns="" xmlns:m="http://schemas.openxmlformats.org/officeDocument/2006/math" xmlns:a14="http://schemas.microsoft.com/office/drawing/2010/main" xmlns:ma14="http://schemas.microsoft.com/office/mac/drawingml/2011/main" val="1"/>
             </a:ext>
           </a:extLst>
         </p:spPr>
@@ -8108,7 +8108,7 @@
           </a:ln>
           <a:extLst>
             <a:ext uri="{C572A759-6A51-4108-AA02-DFA0A04FC94B}">
-              <ma14:wrappingTextBoxFlag xmlns:ma14="http://schemas.microsoft.com/office/mac/drawingml/2011/main" xmlns:a14="http://schemas.microsoft.com/office/drawing/2010/main" xmlns:m="http://schemas.openxmlformats.org/officeDocument/2006/math" xmlns="" val="1"/>
+              <ma14:wrappingTextBoxFlag xmlns="" xmlns:m="http://schemas.openxmlformats.org/officeDocument/2006/math" xmlns:a14="http://schemas.microsoft.com/office/drawing/2010/main" xmlns:ma14="http://schemas.microsoft.com/office/mac/drawingml/2011/main" val="1"/>
             </a:ext>
           </a:extLst>
         </p:spPr>
@@ -8392,7 +8392,7 @@
           </a:ln>
           <a:extLst>
             <a:ext uri="{C572A759-6A51-4108-AA02-DFA0A04FC94B}">
-              <ma14:wrappingTextBoxFlag xmlns:ma14="http://schemas.microsoft.com/office/mac/drawingml/2011/main" xmlns:a14="http://schemas.microsoft.com/office/drawing/2010/main" xmlns:m="http://schemas.openxmlformats.org/officeDocument/2006/math" xmlns="" val="1"/>
+              <ma14:wrappingTextBoxFlag xmlns="" xmlns:m="http://schemas.openxmlformats.org/officeDocument/2006/math" xmlns:a14="http://schemas.microsoft.com/office/drawing/2010/main" xmlns:ma14="http://schemas.microsoft.com/office/mac/drawingml/2011/main" val="1"/>
             </a:ext>
           </a:extLst>
         </p:spPr>
@@ -8443,7 +8443,7 @@
           </a:ln>
           <a:extLst>
             <a:ext uri="{C572A759-6A51-4108-AA02-DFA0A04FC94B}">
-              <ma14:wrappingTextBoxFlag xmlns:ma14="http://schemas.microsoft.com/office/mac/drawingml/2011/main" xmlns:a14="http://schemas.microsoft.com/office/drawing/2010/main" xmlns:m="http://schemas.openxmlformats.org/officeDocument/2006/math" xmlns="" val="1"/>
+              <ma14:wrappingTextBoxFlag xmlns="" xmlns:m="http://schemas.openxmlformats.org/officeDocument/2006/math" xmlns:a14="http://schemas.microsoft.com/office/drawing/2010/main" xmlns:ma14="http://schemas.microsoft.com/office/mac/drawingml/2011/main" val="1"/>
             </a:ext>
           </a:extLst>
         </p:spPr>
@@ -8494,7 +8494,7 @@
           </a:ln>
           <a:extLst>
             <a:ext uri="{C572A759-6A51-4108-AA02-DFA0A04FC94B}">
-              <ma14:wrappingTextBoxFlag xmlns:ma14="http://schemas.microsoft.com/office/mac/drawingml/2011/main" xmlns:a14="http://schemas.microsoft.com/office/drawing/2010/main" xmlns:m="http://schemas.openxmlformats.org/officeDocument/2006/math" xmlns="" val="1"/>
+              <ma14:wrappingTextBoxFlag xmlns="" xmlns:m="http://schemas.openxmlformats.org/officeDocument/2006/math" xmlns:a14="http://schemas.microsoft.com/office/drawing/2010/main" xmlns:ma14="http://schemas.microsoft.com/office/mac/drawingml/2011/main" val="1"/>
             </a:ext>
           </a:extLst>
         </p:spPr>
@@ -8540,7 +8540,7 @@
           </a:ln>
           <a:extLst>
             <a:ext uri="{C572A759-6A51-4108-AA02-DFA0A04FC94B}">
-              <ma14:wrappingTextBoxFlag xmlns:ma14="http://schemas.microsoft.com/office/mac/drawingml/2011/main" xmlns:a14="http://schemas.microsoft.com/office/drawing/2010/main" xmlns:m="http://schemas.openxmlformats.org/officeDocument/2006/math" xmlns="" val="1"/>
+              <ma14:wrappingTextBoxFlag xmlns="" xmlns:m="http://schemas.openxmlformats.org/officeDocument/2006/math" xmlns:a14="http://schemas.microsoft.com/office/drawing/2010/main" xmlns:ma14="http://schemas.microsoft.com/office/mac/drawingml/2011/main" val="1"/>
             </a:ext>
           </a:extLst>
         </p:spPr>
@@ -8586,7 +8586,7 @@
           </a:ln>
           <a:extLst>
             <a:ext uri="{C572A759-6A51-4108-AA02-DFA0A04FC94B}">
-              <ma14:wrappingTextBoxFlag xmlns:ma14="http://schemas.microsoft.com/office/mac/drawingml/2011/main" xmlns:a14="http://schemas.microsoft.com/office/drawing/2010/main" xmlns:m="http://schemas.openxmlformats.org/officeDocument/2006/math" xmlns="" val="1"/>
+              <ma14:wrappingTextBoxFlag xmlns="" xmlns:m="http://schemas.openxmlformats.org/officeDocument/2006/math" xmlns:a14="http://schemas.microsoft.com/office/drawing/2010/main" xmlns:ma14="http://schemas.microsoft.com/office/mac/drawingml/2011/main" val="1"/>
             </a:ext>
           </a:extLst>
         </p:spPr>
@@ -8986,7 +8986,7 @@
           </a:ln>
           <a:extLst>
             <a:ext uri="{C572A759-6A51-4108-AA02-DFA0A04FC94B}">
-              <ma14:wrappingTextBoxFlag xmlns:ma14="http://schemas.microsoft.com/office/mac/drawingml/2011/main" xmlns:a14="http://schemas.microsoft.com/office/drawing/2010/main" xmlns:m="http://schemas.openxmlformats.org/officeDocument/2006/math" xmlns="" val="1"/>
+              <ma14:wrappingTextBoxFlag xmlns="" xmlns:m="http://schemas.openxmlformats.org/officeDocument/2006/math" xmlns:a14="http://schemas.microsoft.com/office/drawing/2010/main" xmlns:ma14="http://schemas.microsoft.com/office/mac/drawingml/2011/main" val="1"/>
             </a:ext>
           </a:extLst>
         </p:spPr>
@@ -9051,7 +9051,7 @@
           </a:ln>
           <a:extLst>
             <a:ext uri="{C572A759-6A51-4108-AA02-DFA0A04FC94B}">
-              <ma14:wrappingTextBoxFlag xmlns:ma14="http://schemas.microsoft.com/office/mac/drawingml/2011/main" xmlns:a14="http://schemas.microsoft.com/office/drawing/2010/main" xmlns:m="http://schemas.openxmlformats.org/officeDocument/2006/math" xmlns="" val="1"/>
+              <ma14:wrappingTextBoxFlag xmlns="" xmlns:m="http://schemas.openxmlformats.org/officeDocument/2006/math" xmlns:a14="http://schemas.microsoft.com/office/drawing/2010/main" xmlns:ma14="http://schemas.microsoft.com/office/mac/drawingml/2011/main" val="1"/>
             </a:ext>
           </a:extLst>
         </p:spPr>
@@ -9193,7 +9193,7 @@
           </a:ln>
           <a:extLst>
             <a:ext uri="{C572A759-6A51-4108-AA02-DFA0A04FC94B}">
-              <ma14:wrappingTextBoxFlag xmlns:ma14="http://schemas.microsoft.com/office/mac/drawingml/2011/main" xmlns:a14="http://schemas.microsoft.com/office/drawing/2010/main" xmlns:m="http://schemas.openxmlformats.org/officeDocument/2006/math" xmlns="" val="1"/>
+              <ma14:wrappingTextBoxFlag xmlns="" xmlns:m="http://schemas.openxmlformats.org/officeDocument/2006/math" xmlns:a14="http://schemas.microsoft.com/office/drawing/2010/main" xmlns:ma14="http://schemas.microsoft.com/office/mac/drawingml/2011/main" val="1"/>
             </a:ext>
           </a:extLst>
         </p:spPr>
@@ -9228,7 +9228,7 @@
           </a:ln>
           <a:extLst>
             <a:ext uri="{C572A759-6A51-4108-AA02-DFA0A04FC94B}">
-              <ma14:wrappingTextBoxFlag xmlns:ma14="http://schemas.microsoft.com/office/mac/drawingml/2011/main" xmlns:a14="http://schemas.microsoft.com/office/drawing/2010/main" xmlns:m="http://schemas.openxmlformats.org/officeDocument/2006/math" xmlns="" val="1"/>
+              <ma14:wrappingTextBoxFlag xmlns="" xmlns:m="http://schemas.openxmlformats.org/officeDocument/2006/math" xmlns:a14="http://schemas.microsoft.com/office/drawing/2010/main" xmlns:ma14="http://schemas.microsoft.com/office/mac/drawingml/2011/main" val="1"/>
             </a:ext>
           </a:extLst>
         </p:spPr>
@@ -9276,7 +9276,7 @@
           </a:ln>
           <a:extLst>
             <a:ext uri="{C572A759-6A51-4108-AA02-DFA0A04FC94B}">
-              <ma14:wrappingTextBoxFlag xmlns:ma14="http://schemas.microsoft.com/office/mac/drawingml/2011/main" xmlns:a14="http://schemas.microsoft.com/office/drawing/2010/main" xmlns:m="http://schemas.openxmlformats.org/officeDocument/2006/math" xmlns="" val="1"/>
+              <ma14:wrappingTextBoxFlag xmlns="" xmlns:m="http://schemas.openxmlformats.org/officeDocument/2006/math" xmlns:a14="http://schemas.microsoft.com/office/drawing/2010/main" xmlns:ma14="http://schemas.microsoft.com/office/mac/drawingml/2011/main" val="1"/>
             </a:ext>
           </a:extLst>
         </p:spPr>
@@ -9370,7 +9370,7 @@
           </a:ln>
           <a:extLst>
             <a:ext uri="{C572A759-6A51-4108-AA02-DFA0A04FC94B}">
-              <ma14:wrappingTextBoxFlag xmlns:ma14="http://schemas.microsoft.com/office/mac/drawingml/2011/main" xmlns:a14="http://schemas.microsoft.com/office/drawing/2010/main" xmlns:m="http://schemas.openxmlformats.org/officeDocument/2006/math" xmlns="" val="1"/>
+              <ma14:wrappingTextBoxFlag xmlns="" xmlns:m="http://schemas.openxmlformats.org/officeDocument/2006/math" xmlns:a14="http://schemas.microsoft.com/office/drawing/2010/main" xmlns:ma14="http://schemas.microsoft.com/office/mac/drawingml/2011/main" val="1"/>
             </a:ext>
           </a:extLst>
         </p:spPr>
@@ -9416,7 +9416,7 @@
           </a:ln>
           <a:extLst>
             <a:ext uri="{C572A759-6A51-4108-AA02-DFA0A04FC94B}">
-              <ma14:wrappingTextBoxFlag xmlns:ma14="http://schemas.microsoft.com/office/mac/drawingml/2011/main" xmlns:a14="http://schemas.microsoft.com/office/drawing/2010/main" xmlns:m="http://schemas.openxmlformats.org/officeDocument/2006/math" xmlns="" val="1"/>
+              <ma14:wrappingTextBoxFlag xmlns="" xmlns:m="http://schemas.openxmlformats.org/officeDocument/2006/math" xmlns:a14="http://schemas.microsoft.com/office/drawing/2010/main" xmlns:ma14="http://schemas.microsoft.com/office/mac/drawingml/2011/main" val="1"/>
             </a:ext>
           </a:extLst>
         </p:spPr>
@@ -9652,7 +9652,7 @@
           </a:ln>
           <a:extLst>
             <a:ext uri="{C572A759-6A51-4108-AA02-DFA0A04FC94B}">
-              <ma14:wrappingTextBoxFlag xmlns:ma14="http://schemas.microsoft.com/office/mac/drawingml/2011/main" xmlns:a14="http://schemas.microsoft.com/office/drawing/2010/main" xmlns:m="http://schemas.openxmlformats.org/officeDocument/2006/math" xmlns="" val="1"/>
+              <ma14:wrappingTextBoxFlag xmlns="" xmlns:m="http://schemas.openxmlformats.org/officeDocument/2006/math" xmlns:a14="http://schemas.microsoft.com/office/drawing/2010/main" xmlns:ma14="http://schemas.microsoft.com/office/mac/drawingml/2011/main" val="1"/>
             </a:ext>
           </a:extLst>
         </p:spPr>
@@ -9700,7 +9700,7 @@
           </a:ln>
           <a:extLst>
             <a:ext uri="{C572A759-6A51-4108-AA02-DFA0A04FC94B}">
-              <ma14:wrappingTextBoxFlag xmlns:ma14="http://schemas.microsoft.com/office/mac/drawingml/2011/main" xmlns:a14="http://schemas.microsoft.com/office/drawing/2010/main" xmlns:m="http://schemas.openxmlformats.org/officeDocument/2006/math" xmlns="" val="1"/>
+              <ma14:wrappingTextBoxFlag xmlns="" xmlns:m="http://schemas.openxmlformats.org/officeDocument/2006/math" xmlns:a14="http://schemas.microsoft.com/office/drawing/2010/main" xmlns:ma14="http://schemas.microsoft.com/office/mac/drawingml/2011/main" val="1"/>
             </a:ext>
           </a:extLst>
         </p:spPr>
@@ -9745,7 +9745,7 @@
           </a:ln>
           <a:extLst>
             <a:ext uri="{C572A759-6A51-4108-AA02-DFA0A04FC94B}">
-              <ma14:wrappingTextBoxFlag xmlns:ma14="http://schemas.microsoft.com/office/mac/drawingml/2011/main" xmlns:a14="http://schemas.microsoft.com/office/drawing/2010/main" xmlns:m="http://schemas.openxmlformats.org/officeDocument/2006/math" xmlns="" val="1"/>
+              <ma14:wrappingTextBoxFlag xmlns="" xmlns:m="http://schemas.openxmlformats.org/officeDocument/2006/math" xmlns:a14="http://schemas.microsoft.com/office/drawing/2010/main" xmlns:ma14="http://schemas.microsoft.com/office/mac/drawingml/2011/main" val="1"/>
             </a:ext>
           </a:extLst>
         </p:spPr>
@@ -9790,7 +9790,7 @@
           </a:ln>
           <a:extLst>
             <a:ext uri="{C572A759-6A51-4108-AA02-DFA0A04FC94B}">
-              <ma14:wrappingTextBoxFlag xmlns:ma14="http://schemas.microsoft.com/office/mac/drawingml/2011/main" xmlns:a14="http://schemas.microsoft.com/office/drawing/2010/main" xmlns:m="http://schemas.openxmlformats.org/officeDocument/2006/math" xmlns="" val="1"/>
+              <ma14:wrappingTextBoxFlag xmlns="" xmlns:m="http://schemas.openxmlformats.org/officeDocument/2006/math" xmlns:a14="http://schemas.microsoft.com/office/drawing/2010/main" xmlns:ma14="http://schemas.microsoft.com/office/mac/drawingml/2011/main" val="1"/>
             </a:ext>
           </a:extLst>
         </p:spPr>
@@ -10074,7 +10074,7 @@
           </a:ln>
           <a:extLst>
             <a:ext uri="{C572A759-6A51-4108-AA02-DFA0A04FC94B}">
-              <ma14:wrappingTextBoxFlag xmlns:ma14="http://schemas.microsoft.com/office/mac/drawingml/2011/main" xmlns:a14="http://schemas.microsoft.com/office/drawing/2010/main" xmlns:m="http://schemas.openxmlformats.org/officeDocument/2006/math" xmlns="" val="1"/>
+              <ma14:wrappingTextBoxFlag xmlns="" xmlns:m="http://schemas.openxmlformats.org/officeDocument/2006/math" xmlns:a14="http://schemas.microsoft.com/office/drawing/2010/main" xmlns:ma14="http://schemas.microsoft.com/office/mac/drawingml/2011/main" val="1"/>
             </a:ext>
           </a:extLst>
         </p:spPr>
@@ -10474,7 +10474,7 @@
           </a:ln>
           <a:extLst>
             <a:ext uri="{C572A759-6A51-4108-AA02-DFA0A04FC94B}">
-              <ma14:wrappingTextBoxFlag xmlns:ma14="http://schemas.microsoft.com/office/mac/drawingml/2011/main" xmlns:a14="http://schemas.microsoft.com/office/drawing/2010/main" xmlns:m="http://schemas.openxmlformats.org/officeDocument/2006/math" xmlns="" val="1"/>
+              <ma14:wrappingTextBoxFlag xmlns="" xmlns:m="http://schemas.openxmlformats.org/officeDocument/2006/math" xmlns:a14="http://schemas.microsoft.com/office/drawing/2010/main" xmlns:ma14="http://schemas.microsoft.com/office/mac/drawingml/2011/main" val="1"/>
             </a:ext>
           </a:extLst>
         </p:spPr>
@@ -10539,7 +10539,7 @@
           </a:ln>
           <a:extLst>
             <a:ext uri="{C572A759-6A51-4108-AA02-DFA0A04FC94B}">
-              <ma14:wrappingTextBoxFlag xmlns:ma14="http://schemas.microsoft.com/office/mac/drawingml/2011/main" xmlns:a14="http://schemas.microsoft.com/office/drawing/2010/main" xmlns:m="http://schemas.openxmlformats.org/officeDocument/2006/math" xmlns="" val="1"/>
+              <ma14:wrappingTextBoxFlag xmlns="" xmlns:m="http://schemas.openxmlformats.org/officeDocument/2006/math" xmlns:a14="http://schemas.microsoft.com/office/drawing/2010/main" xmlns:ma14="http://schemas.microsoft.com/office/mac/drawingml/2011/main" val="1"/>
             </a:ext>
           </a:extLst>
         </p:spPr>
@@ -10655,7 +10655,7 @@
           </a:ln>
           <a:extLst>
             <a:ext uri="{C572A759-6A51-4108-AA02-DFA0A04FC94B}">
-              <ma14:wrappingTextBoxFlag xmlns:ma14="http://schemas.microsoft.com/office/mac/drawingml/2011/main" xmlns:a14="http://schemas.microsoft.com/office/drawing/2010/main" xmlns:m="http://schemas.openxmlformats.org/officeDocument/2006/math" xmlns="" val="1"/>
+              <ma14:wrappingTextBoxFlag xmlns="" xmlns:m="http://schemas.openxmlformats.org/officeDocument/2006/math" xmlns:a14="http://schemas.microsoft.com/office/drawing/2010/main" xmlns:ma14="http://schemas.microsoft.com/office/mac/drawingml/2011/main" val="1"/>
             </a:ext>
           </a:extLst>
         </p:spPr>
@@ -10706,7 +10706,7 @@
           </a:ln>
           <a:extLst>
             <a:ext uri="{C572A759-6A51-4108-AA02-DFA0A04FC94B}">
-              <ma14:wrappingTextBoxFlag xmlns:ma14="http://schemas.microsoft.com/office/mac/drawingml/2011/main" xmlns:a14="http://schemas.microsoft.com/office/drawing/2010/main" xmlns:m="http://schemas.openxmlformats.org/officeDocument/2006/math" xmlns="" val="1"/>
+              <ma14:wrappingTextBoxFlag xmlns="" xmlns:m="http://schemas.openxmlformats.org/officeDocument/2006/math" xmlns:a14="http://schemas.microsoft.com/office/drawing/2010/main" xmlns:ma14="http://schemas.microsoft.com/office/mac/drawingml/2011/main" val="1"/>
             </a:ext>
           </a:extLst>
         </p:spPr>
@@ -10757,7 +10757,7 @@
           </a:ln>
           <a:extLst>
             <a:ext uri="{C572A759-6A51-4108-AA02-DFA0A04FC94B}">
-              <ma14:wrappingTextBoxFlag xmlns:ma14="http://schemas.microsoft.com/office/mac/drawingml/2011/main" xmlns:a14="http://schemas.microsoft.com/office/drawing/2010/main" xmlns:m="http://schemas.openxmlformats.org/officeDocument/2006/math" xmlns="" val="1"/>
+              <ma14:wrappingTextBoxFlag xmlns="" xmlns:m="http://schemas.openxmlformats.org/officeDocument/2006/math" xmlns:a14="http://schemas.microsoft.com/office/drawing/2010/main" xmlns:ma14="http://schemas.microsoft.com/office/mac/drawingml/2011/main" val="1"/>
             </a:ext>
           </a:extLst>
         </p:spPr>
@@ -10803,7 +10803,7 @@
           </a:ln>
           <a:extLst>
             <a:ext uri="{C572A759-6A51-4108-AA02-DFA0A04FC94B}">
-              <ma14:wrappingTextBoxFlag xmlns:ma14="http://schemas.microsoft.com/office/mac/drawingml/2011/main" xmlns:a14="http://schemas.microsoft.com/office/drawing/2010/main" xmlns:m="http://schemas.openxmlformats.org/officeDocument/2006/math" xmlns="" val="1"/>
+              <ma14:wrappingTextBoxFlag xmlns="" xmlns:m="http://schemas.openxmlformats.org/officeDocument/2006/math" xmlns:a14="http://schemas.microsoft.com/office/drawing/2010/main" xmlns:ma14="http://schemas.microsoft.com/office/mac/drawingml/2011/main" val="1"/>
             </a:ext>
           </a:extLst>
         </p:spPr>
@@ -10849,7 +10849,7 @@
           </a:ln>
           <a:extLst>
             <a:ext uri="{C572A759-6A51-4108-AA02-DFA0A04FC94B}">
-              <ma14:wrappingTextBoxFlag xmlns:ma14="http://schemas.microsoft.com/office/mac/drawingml/2011/main" xmlns:a14="http://schemas.microsoft.com/office/drawing/2010/main" xmlns:m="http://schemas.openxmlformats.org/officeDocument/2006/math" xmlns="" val="1"/>
+              <ma14:wrappingTextBoxFlag xmlns="" xmlns:m="http://schemas.openxmlformats.org/officeDocument/2006/math" xmlns:a14="http://schemas.microsoft.com/office/drawing/2010/main" xmlns:ma14="http://schemas.microsoft.com/office/mac/drawingml/2011/main" val="1"/>
             </a:ext>
           </a:extLst>
         </p:spPr>
@@ -10895,7 +10895,7 @@
           </a:ln>
           <a:extLst>
             <a:ext uri="{C572A759-6A51-4108-AA02-DFA0A04FC94B}">
-              <ma14:wrappingTextBoxFlag xmlns:ma14="http://schemas.microsoft.com/office/mac/drawingml/2011/main" xmlns:a14="http://schemas.microsoft.com/office/drawing/2010/main" xmlns:m="http://schemas.openxmlformats.org/officeDocument/2006/math" xmlns="" val="1"/>
+              <ma14:wrappingTextBoxFlag xmlns="" xmlns:m="http://schemas.openxmlformats.org/officeDocument/2006/math" xmlns:a14="http://schemas.microsoft.com/office/drawing/2010/main" xmlns:ma14="http://schemas.microsoft.com/office/mac/drawingml/2011/main" val="1"/>
             </a:ext>
           </a:extLst>
         </p:spPr>
@@ -10941,7 +10941,7 @@
           </a:ln>
           <a:extLst>
             <a:ext uri="{C572A759-6A51-4108-AA02-DFA0A04FC94B}">
-              <ma14:wrappingTextBoxFlag xmlns:ma14="http://schemas.microsoft.com/office/mac/drawingml/2011/main" xmlns:a14="http://schemas.microsoft.com/office/drawing/2010/main" xmlns:m="http://schemas.openxmlformats.org/officeDocument/2006/math" xmlns="" val="1"/>
+              <ma14:wrappingTextBoxFlag xmlns="" xmlns:m="http://schemas.openxmlformats.org/officeDocument/2006/math" xmlns:a14="http://schemas.microsoft.com/office/drawing/2010/main" xmlns:ma14="http://schemas.microsoft.com/office/mac/drawingml/2011/main" val="1"/>
             </a:ext>
           </a:extLst>
         </p:spPr>
@@ -11112,7 +11112,7 @@
           </a:ln>
           <a:extLst>
             <a:ext uri="{C572A759-6A51-4108-AA02-DFA0A04FC94B}">
-              <ma14:wrappingTextBoxFlag xmlns:ma14="http://schemas.microsoft.com/office/mac/drawingml/2011/main" xmlns:a14="http://schemas.microsoft.com/office/drawing/2010/main" xmlns:m="http://schemas.openxmlformats.org/officeDocument/2006/math" xmlns="" val="1"/>
+              <ma14:wrappingTextBoxFlag xmlns="" xmlns:m="http://schemas.openxmlformats.org/officeDocument/2006/math" xmlns:a14="http://schemas.microsoft.com/office/drawing/2010/main" xmlns:ma14="http://schemas.microsoft.com/office/mac/drawingml/2011/main" val="1"/>
             </a:ext>
           </a:extLst>
         </p:spPr>
@@ -11147,7 +11147,7 @@
           </a:ln>
           <a:extLst>
             <a:ext uri="{C572A759-6A51-4108-AA02-DFA0A04FC94B}">
-              <ma14:wrappingTextBoxFlag xmlns:ma14="http://schemas.microsoft.com/office/mac/drawingml/2011/main" xmlns:a14="http://schemas.microsoft.com/office/drawing/2010/main" xmlns:m="http://schemas.openxmlformats.org/officeDocument/2006/math" xmlns="" val="1"/>
+              <ma14:wrappingTextBoxFlag xmlns="" xmlns:m="http://schemas.openxmlformats.org/officeDocument/2006/math" xmlns:a14="http://schemas.microsoft.com/office/drawing/2010/main" xmlns:ma14="http://schemas.microsoft.com/office/mac/drawingml/2011/main" val="1"/>
             </a:ext>
           </a:extLst>
         </p:spPr>
@@ -11194,7 +11194,7 @@
           </a:ln>
           <a:extLst>
             <a:ext uri="{C572A759-6A51-4108-AA02-DFA0A04FC94B}">
-              <ma14:wrappingTextBoxFlag xmlns:ma14="http://schemas.microsoft.com/office/mac/drawingml/2011/main" xmlns:a14="http://schemas.microsoft.com/office/drawing/2010/main" xmlns:m="http://schemas.openxmlformats.org/officeDocument/2006/math" xmlns="" val="1"/>
+              <ma14:wrappingTextBoxFlag xmlns="" xmlns:m="http://schemas.openxmlformats.org/officeDocument/2006/math" xmlns:a14="http://schemas.microsoft.com/office/drawing/2010/main" xmlns:ma14="http://schemas.microsoft.com/office/mac/drawingml/2011/main" val="1"/>
             </a:ext>
           </a:extLst>
         </p:spPr>
@@ -11288,7 +11288,7 @@
           </a:ln>
           <a:extLst>
             <a:ext uri="{C572A759-6A51-4108-AA02-DFA0A04FC94B}">
-              <ma14:wrappingTextBoxFlag xmlns:ma14="http://schemas.microsoft.com/office/mac/drawingml/2011/main" xmlns:a14="http://schemas.microsoft.com/office/drawing/2010/main" xmlns:m="http://schemas.openxmlformats.org/officeDocument/2006/math" xmlns="" val="1"/>
+              <ma14:wrappingTextBoxFlag xmlns="" xmlns:m="http://schemas.openxmlformats.org/officeDocument/2006/math" xmlns:a14="http://schemas.microsoft.com/office/drawing/2010/main" xmlns:ma14="http://schemas.microsoft.com/office/mac/drawingml/2011/main" val="1"/>
             </a:ext>
           </a:extLst>
         </p:spPr>
@@ -11334,7 +11334,7 @@
           </a:ln>
           <a:extLst>
             <a:ext uri="{C572A759-6A51-4108-AA02-DFA0A04FC94B}">
-              <ma14:wrappingTextBoxFlag xmlns:ma14="http://schemas.microsoft.com/office/mac/drawingml/2011/main" xmlns:a14="http://schemas.microsoft.com/office/drawing/2010/main" xmlns:m="http://schemas.openxmlformats.org/officeDocument/2006/math" xmlns="" val="1"/>
+              <ma14:wrappingTextBoxFlag xmlns="" xmlns:m="http://schemas.openxmlformats.org/officeDocument/2006/math" xmlns:a14="http://schemas.microsoft.com/office/drawing/2010/main" xmlns:ma14="http://schemas.microsoft.com/office/mac/drawingml/2011/main" val="1"/>
             </a:ext>
           </a:extLst>
         </p:spPr>
@@ -11380,7 +11380,7 @@
           </a:ln>
           <a:extLst>
             <a:ext uri="{C572A759-6A51-4108-AA02-DFA0A04FC94B}">
-              <ma14:wrappingTextBoxFlag xmlns:ma14="http://schemas.microsoft.com/office/mac/drawingml/2011/main" xmlns:a14="http://schemas.microsoft.com/office/drawing/2010/main" xmlns:m="http://schemas.openxmlformats.org/officeDocument/2006/math" xmlns="" val="1"/>
+              <ma14:wrappingTextBoxFlag xmlns="" xmlns:m="http://schemas.openxmlformats.org/officeDocument/2006/math" xmlns:a14="http://schemas.microsoft.com/office/drawing/2010/main" xmlns:ma14="http://schemas.microsoft.com/office/mac/drawingml/2011/main" val="1"/>
             </a:ext>
           </a:extLst>
         </p:spPr>
@@ -11702,7 +11702,7 @@
           </a:ln>
           <a:extLst>
             <a:ext uri="{C572A759-6A51-4108-AA02-DFA0A04FC94B}">
-              <ma14:wrappingTextBoxFlag xmlns:ma14="http://schemas.microsoft.com/office/mac/drawingml/2011/main" xmlns:a14="http://schemas.microsoft.com/office/drawing/2010/main" xmlns:m="http://schemas.openxmlformats.org/officeDocument/2006/math" xmlns="" val="1"/>
+              <ma14:wrappingTextBoxFlag xmlns="" xmlns:m="http://schemas.openxmlformats.org/officeDocument/2006/math" xmlns:a14="http://schemas.microsoft.com/office/drawing/2010/main" xmlns:ma14="http://schemas.microsoft.com/office/mac/drawingml/2011/main" val="1"/>
             </a:ext>
           </a:extLst>
         </p:spPr>
@@ -11750,7 +11750,7 @@
           </a:ln>
           <a:extLst>
             <a:ext uri="{C572A759-6A51-4108-AA02-DFA0A04FC94B}">
-              <ma14:wrappingTextBoxFlag xmlns:ma14="http://schemas.microsoft.com/office/mac/drawingml/2011/main" xmlns:a14="http://schemas.microsoft.com/office/drawing/2010/main" xmlns:m="http://schemas.openxmlformats.org/officeDocument/2006/math" xmlns="" val="1"/>
+              <ma14:wrappingTextBoxFlag xmlns="" xmlns:m="http://schemas.openxmlformats.org/officeDocument/2006/math" xmlns:a14="http://schemas.microsoft.com/office/drawing/2010/main" xmlns:ma14="http://schemas.microsoft.com/office/mac/drawingml/2011/main" val="1"/>
             </a:ext>
           </a:extLst>
         </p:spPr>
@@ -11795,7 +11795,7 @@
           </a:ln>
           <a:extLst>
             <a:ext uri="{C572A759-6A51-4108-AA02-DFA0A04FC94B}">
-              <ma14:wrappingTextBoxFlag xmlns:ma14="http://schemas.microsoft.com/office/mac/drawingml/2011/main" xmlns:a14="http://schemas.microsoft.com/office/drawing/2010/main" xmlns:m="http://schemas.openxmlformats.org/officeDocument/2006/math" xmlns="" val="1"/>
+              <ma14:wrappingTextBoxFlag xmlns="" xmlns:m="http://schemas.openxmlformats.org/officeDocument/2006/math" xmlns:a14="http://schemas.microsoft.com/office/drawing/2010/main" xmlns:ma14="http://schemas.microsoft.com/office/mac/drawingml/2011/main" val="1"/>
             </a:ext>
           </a:extLst>
         </p:spPr>
@@ -11840,7 +11840,7 @@
           </a:ln>
           <a:extLst>
             <a:ext uri="{C572A759-6A51-4108-AA02-DFA0A04FC94B}">
-              <ma14:wrappingTextBoxFlag xmlns:ma14="http://schemas.microsoft.com/office/mac/drawingml/2011/main" xmlns:a14="http://schemas.microsoft.com/office/drawing/2010/main" xmlns:m="http://schemas.openxmlformats.org/officeDocument/2006/math" xmlns="" val="1"/>
+              <ma14:wrappingTextBoxFlag xmlns="" xmlns:m="http://schemas.openxmlformats.org/officeDocument/2006/math" xmlns:a14="http://schemas.microsoft.com/office/drawing/2010/main" xmlns:ma14="http://schemas.microsoft.com/office/mac/drawingml/2011/main" val="1"/>
             </a:ext>
           </a:extLst>
         </p:spPr>
@@ -11871,8 +11871,8 @@
         </p:nvSpPr>
         <p:spPr>
           <a:xfrm>
-            <a:off x="11138321" y="9138024"/>
-            <a:ext cx="549325" cy="457201"/>
+            <a:off x="11284743" y="9130663"/>
+            <a:ext cx="256480" cy="471924"/>
           </a:xfrm>
           <a:prstGeom prst="rect">
             <a:avLst/>
@@ -11882,7 +11882,7 @@
           </a:ln>
           <a:extLst>
             <a:ext uri="{C572A759-6A51-4108-AA02-DFA0A04FC94B}">
-              <ma14:wrappingTextBoxFlag xmlns:ma14="http://schemas.microsoft.com/office/mac/drawingml/2011/main" xmlns:a14="http://schemas.microsoft.com/office/drawing/2010/main" xmlns:m="http://schemas.openxmlformats.org/officeDocument/2006/math" xmlns="" val="1"/>
+              <ma14:wrappingTextBoxFlag xmlns="" xmlns:m="http://schemas.openxmlformats.org/officeDocument/2006/math" xmlns:a14="http://schemas.microsoft.com/office/drawing/2010/main" xmlns:ma14="http://schemas.microsoft.com/office/mac/drawingml/2011/main" val="1"/>
             </a:ext>
           </a:extLst>
         </p:spPr>
@@ -11897,9 +11897,10 @@
           </a:lstStyle>
           <a:p>
             <a:r>
-              <a:rPr dirty="0"/>
-              <a:t>"hi"</a:t>
-            </a:r>
+              <a:rPr lang="en-US" dirty="0"/>
+              <a:t>3</a:t>
+            </a:r>
+            <a:endParaRPr dirty="0"/>
           </a:p>
         </p:txBody>
       </p:sp>
@@ -12223,7 +12224,7 @@
           </a:ln>
           <a:extLst>
             <a:ext uri="{C572A759-6A51-4108-AA02-DFA0A04FC94B}">
-              <ma14:wrappingTextBoxFlag xmlns:ma14="http://schemas.microsoft.com/office/mac/drawingml/2011/main" xmlns:a14="http://schemas.microsoft.com/office/drawing/2010/main" xmlns:m="http://schemas.openxmlformats.org/officeDocument/2006/math" xmlns="" val="1"/>
+              <ma14:wrappingTextBoxFlag xmlns="" xmlns:m="http://schemas.openxmlformats.org/officeDocument/2006/math" xmlns:a14="http://schemas.microsoft.com/office/drawing/2010/main" xmlns:ma14="http://schemas.microsoft.com/office/mac/drawingml/2011/main" val="1"/>
             </a:ext>
           </a:extLst>
         </p:spPr>
@@ -12623,7 +12624,7 @@
           </a:ln>
           <a:extLst>
             <a:ext uri="{C572A759-6A51-4108-AA02-DFA0A04FC94B}">
-              <ma14:wrappingTextBoxFlag xmlns:ma14="http://schemas.microsoft.com/office/mac/drawingml/2011/main" xmlns:a14="http://schemas.microsoft.com/office/drawing/2010/main" xmlns:m="http://schemas.openxmlformats.org/officeDocument/2006/math" xmlns="" val="1"/>
+              <ma14:wrappingTextBoxFlag xmlns="" xmlns:m="http://schemas.openxmlformats.org/officeDocument/2006/math" xmlns:a14="http://schemas.microsoft.com/office/drawing/2010/main" xmlns:ma14="http://schemas.microsoft.com/office/mac/drawingml/2011/main" val="1"/>
             </a:ext>
           </a:extLst>
         </p:spPr>
@@ -12688,7 +12689,7 @@
           </a:ln>
           <a:extLst>
             <a:ext uri="{C572A759-6A51-4108-AA02-DFA0A04FC94B}">
-              <ma14:wrappingTextBoxFlag xmlns:ma14="http://schemas.microsoft.com/office/mac/drawingml/2011/main" xmlns:a14="http://schemas.microsoft.com/office/drawing/2010/main" xmlns:m="http://schemas.openxmlformats.org/officeDocument/2006/math" xmlns="" val="1"/>
+              <ma14:wrappingTextBoxFlag xmlns="" xmlns:m="http://schemas.openxmlformats.org/officeDocument/2006/math" xmlns:a14="http://schemas.microsoft.com/office/drawing/2010/main" xmlns:ma14="http://schemas.microsoft.com/office/mac/drawingml/2011/main" val="1"/>
             </a:ext>
           </a:extLst>
         </p:spPr>
@@ -12761,7 +12762,7 @@
           </a:ln>
           <a:extLst>
             <a:ext uri="{C572A759-6A51-4108-AA02-DFA0A04FC94B}">
-              <ma14:wrappingTextBoxFlag xmlns:ma14="http://schemas.microsoft.com/office/mac/drawingml/2011/main" xmlns:a14="http://schemas.microsoft.com/office/drawing/2010/main" xmlns:m="http://schemas.openxmlformats.org/officeDocument/2006/math" xmlns="" val="1"/>
+              <ma14:wrappingTextBoxFlag xmlns="" xmlns:m="http://schemas.openxmlformats.org/officeDocument/2006/math" xmlns:a14="http://schemas.microsoft.com/office/drawing/2010/main" xmlns:ma14="http://schemas.microsoft.com/office/mac/drawingml/2011/main" val="1"/>
             </a:ext>
           </a:extLst>
         </p:spPr>
@@ -12812,7 +12813,7 @@
           </a:ln>
           <a:extLst>
             <a:ext uri="{C572A759-6A51-4108-AA02-DFA0A04FC94B}">
-              <ma14:wrappingTextBoxFlag xmlns:ma14="http://schemas.microsoft.com/office/mac/drawingml/2011/main" xmlns:a14="http://schemas.microsoft.com/office/drawing/2010/main" xmlns:m="http://schemas.openxmlformats.org/officeDocument/2006/math" xmlns="" val="1"/>
+              <ma14:wrappingTextBoxFlag xmlns="" xmlns:m="http://schemas.openxmlformats.org/officeDocument/2006/math" xmlns:a14="http://schemas.microsoft.com/office/drawing/2010/main" xmlns:ma14="http://schemas.microsoft.com/office/mac/drawingml/2011/main" val="1"/>
             </a:ext>
           </a:extLst>
         </p:spPr>
@@ -12863,7 +12864,7 @@
           </a:ln>
           <a:extLst>
             <a:ext uri="{C572A759-6A51-4108-AA02-DFA0A04FC94B}">
-              <ma14:wrappingTextBoxFlag xmlns:ma14="http://schemas.microsoft.com/office/mac/drawingml/2011/main" xmlns:a14="http://schemas.microsoft.com/office/drawing/2010/main" xmlns:m="http://schemas.openxmlformats.org/officeDocument/2006/math" xmlns="" val="1"/>
+              <ma14:wrappingTextBoxFlag xmlns="" xmlns:m="http://schemas.openxmlformats.org/officeDocument/2006/math" xmlns:a14="http://schemas.microsoft.com/office/drawing/2010/main" xmlns:ma14="http://schemas.microsoft.com/office/mac/drawingml/2011/main" val="1"/>
             </a:ext>
           </a:extLst>
         </p:spPr>
@@ -12909,7 +12910,7 @@
           </a:ln>
           <a:extLst>
             <a:ext uri="{C572A759-6A51-4108-AA02-DFA0A04FC94B}">
-              <ma14:wrappingTextBoxFlag xmlns:ma14="http://schemas.microsoft.com/office/mac/drawingml/2011/main" xmlns:a14="http://schemas.microsoft.com/office/drawing/2010/main" xmlns:m="http://schemas.openxmlformats.org/officeDocument/2006/math" xmlns="" val="1"/>
+              <ma14:wrappingTextBoxFlag xmlns="" xmlns:m="http://schemas.openxmlformats.org/officeDocument/2006/math" xmlns:a14="http://schemas.microsoft.com/office/drawing/2010/main" xmlns:ma14="http://schemas.microsoft.com/office/mac/drawingml/2011/main" val="1"/>
             </a:ext>
           </a:extLst>
         </p:spPr>
@@ -12955,7 +12956,7 @@
           </a:ln>
           <a:extLst>
             <a:ext uri="{C572A759-6A51-4108-AA02-DFA0A04FC94B}">
-              <ma14:wrappingTextBoxFlag xmlns:ma14="http://schemas.microsoft.com/office/mac/drawingml/2011/main" xmlns:a14="http://schemas.microsoft.com/office/drawing/2010/main" xmlns:m="http://schemas.openxmlformats.org/officeDocument/2006/math" xmlns="" val="1"/>
+              <ma14:wrappingTextBoxFlag xmlns="" xmlns:m="http://schemas.openxmlformats.org/officeDocument/2006/math" xmlns:a14="http://schemas.microsoft.com/office/drawing/2010/main" xmlns:ma14="http://schemas.microsoft.com/office/mac/drawingml/2011/main" val="1"/>
             </a:ext>
           </a:extLst>
         </p:spPr>
@@ -13001,7 +13002,7 @@
           </a:ln>
           <a:extLst>
             <a:ext uri="{C572A759-6A51-4108-AA02-DFA0A04FC94B}">
-              <ma14:wrappingTextBoxFlag xmlns:ma14="http://schemas.microsoft.com/office/mac/drawingml/2011/main" xmlns:a14="http://schemas.microsoft.com/office/drawing/2010/main" xmlns:m="http://schemas.openxmlformats.org/officeDocument/2006/math" xmlns="" val="1"/>
+              <ma14:wrappingTextBoxFlag xmlns="" xmlns:m="http://schemas.openxmlformats.org/officeDocument/2006/math" xmlns:a14="http://schemas.microsoft.com/office/drawing/2010/main" xmlns:ma14="http://schemas.microsoft.com/office/mac/drawingml/2011/main" val="1"/>
             </a:ext>
           </a:extLst>
         </p:spPr>
@@ -13047,7 +13048,7 @@
           </a:ln>
           <a:extLst>
             <a:ext uri="{C572A759-6A51-4108-AA02-DFA0A04FC94B}">
-              <ma14:wrappingTextBoxFlag xmlns:ma14="http://schemas.microsoft.com/office/mac/drawingml/2011/main" xmlns:a14="http://schemas.microsoft.com/office/drawing/2010/main" xmlns:m="http://schemas.openxmlformats.org/officeDocument/2006/math" xmlns="" val="1"/>
+              <ma14:wrappingTextBoxFlag xmlns="" xmlns:m="http://schemas.openxmlformats.org/officeDocument/2006/math" xmlns:a14="http://schemas.microsoft.com/office/drawing/2010/main" xmlns:ma14="http://schemas.microsoft.com/office/mac/drawingml/2011/main" val="1"/>
             </a:ext>
           </a:extLst>
         </p:spPr>
@@ -13212,7 +13213,7 @@
           </a:ln>
           <a:extLst>
             <a:ext uri="{C572A759-6A51-4108-AA02-DFA0A04FC94B}">
-              <ma14:wrappingTextBoxFlag xmlns:ma14="http://schemas.microsoft.com/office/mac/drawingml/2011/main" xmlns:a14="http://schemas.microsoft.com/office/drawing/2010/main" xmlns:m="http://schemas.openxmlformats.org/officeDocument/2006/math" xmlns="" val="1"/>
+              <ma14:wrappingTextBoxFlag xmlns="" xmlns:m="http://schemas.openxmlformats.org/officeDocument/2006/math" xmlns:a14="http://schemas.microsoft.com/office/drawing/2010/main" xmlns:ma14="http://schemas.microsoft.com/office/mac/drawingml/2011/main" val="1"/>
             </a:ext>
           </a:extLst>
         </p:spPr>
@@ -13247,7 +13248,7 @@
           </a:ln>
           <a:extLst>
             <a:ext uri="{C572A759-6A51-4108-AA02-DFA0A04FC94B}">
-              <ma14:wrappingTextBoxFlag xmlns:ma14="http://schemas.microsoft.com/office/mac/drawingml/2011/main" xmlns:a14="http://schemas.microsoft.com/office/drawing/2010/main" xmlns:m="http://schemas.openxmlformats.org/officeDocument/2006/math" xmlns="" val="1"/>
+              <ma14:wrappingTextBoxFlag xmlns="" xmlns:m="http://schemas.openxmlformats.org/officeDocument/2006/math" xmlns:a14="http://schemas.microsoft.com/office/drawing/2010/main" xmlns:ma14="http://schemas.microsoft.com/office/mac/drawingml/2011/main" val="1"/>
             </a:ext>
           </a:extLst>
         </p:spPr>
@@ -13294,7 +13295,7 @@
           </a:ln>
           <a:extLst>
             <a:ext uri="{C572A759-6A51-4108-AA02-DFA0A04FC94B}">
-              <ma14:wrappingTextBoxFlag xmlns:ma14="http://schemas.microsoft.com/office/mac/drawingml/2011/main" xmlns:a14="http://schemas.microsoft.com/office/drawing/2010/main" xmlns:m="http://schemas.openxmlformats.org/officeDocument/2006/math" xmlns="" val="1"/>
+              <ma14:wrappingTextBoxFlag xmlns="" xmlns:m="http://schemas.openxmlformats.org/officeDocument/2006/math" xmlns:a14="http://schemas.microsoft.com/office/drawing/2010/main" xmlns:ma14="http://schemas.microsoft.com/office/mac/drawingml/2011/main" val="1"/>
             </a:ext>
           </a:extLst>
         </p:spPr>
@@ -13388,7 +13389,7 @@
           </a:ln>
           <a:extLst>
             <a:ext uri="{C572A759-6A51-4108-AA02-DFA0A04FC94B}">
-              <ma14:wrappingTextBoxFlag xmlns:ma14="http://schemas.microsoft.com/office/mac/drawingml/2011/main" xmlns:a14="http://schemas.microsoft.com/office/drawing/2010/main" xmlns:m="http://schemas.openxmlformats.org/officeDocument/2006/math" xmlns="" val="1"/>
+              <ma14:wrappingTextBoxFlag xmlns="" xmlns:m="http://schemas.openxmlformats.org/officeDocument/2006/math" xmlns:a14="http://schemas.microsoft.com/office/drawing/2010/main" xmlns:ma14="http://schemas.microsoft.com/office/mac/drawingml/2011/main" val="1"/>
             </a:ext>
           </a:extLst>
         </p:spPr>
@@ -13434,7 +13435,7 @@
           </a:ln>
           <a:extLst>
             <a:ext uri="{C572A759-6A51-4108-AA02-DFA0A04FC94B}">
-              <ma14:wrappingTextBoxFlag xmlns:ma14="http://schemas.microsoft.com/office/mac/drawingml/2011/main" xmlns:a14="http://schemas.microsoft.com/office/drawing/2010/main" xmlns:m="http://schemas.openxmlformats.org/officeDocument/2006/math" xmlns="" val="1"/>
+              <ma14:wrappingTextBoxFlag xmlns="" xmlns:m="http://schemas.openxmlformats.org/officeDocument/2006/math" xmlns:a14="http://schemas.microsoft.com/office/drawing/2010/main" xmlns:ma14="http://schemas.microsoft.com/office/mac/drawingml/2011/main" val="1"/>
             </a:ext>
           </a:extLst>
         </p:spPr>
@@ -13485,7 +13486,7 @@
           </a:ln>
           <a:extLst>
             <a:ext uri="{C572A759-6A51-4108-AA02-DFA0A04FC94B}">
-              <ma14:wrappingTextBoxFlag xmlns:ma14="http://schemas.microsoft.com/office/mac/drawingml/2011/main" xmlns:a14="http://schemas.microsoft.com/office/drawing/2010/main" xmlns:m="http://schemas.openxmlformats.org/officeDocument/2006/math" xmlns="" val="1"/>
+              <ma14:wrappingTextBoxFlag xmlns="" xmlns:m="http://schemas.openxmlformats.org/officeDocument/2006/math" xmlns:a14="http://schemas.microsoft.com/office/drawing/2010/main" xmlns:ma14="http://schemas.microsoft.com/office/mac/drawingml/2011/main" val="1"/>
             </a:ext>
           </a:extLst>
         </p:spPr>
@@ -13533,7 +13534,7 @@
           </a:ln>
           <a:extLst>
             <a:ext uri="{C572A759-6A51-4108-AA02-DFA0A04FC94B}">
-              <ma14:wrappingTextBoxFlag xmlns:ma14="http://schemas.microsoft.com/office/mac/drawingml/2011/main" xmlns:a14="http://schemas.microsoft.com/office/drawing/2010/main" xmlns:m="http://schemas.openxmlformats.org/officeDocument/2006/math" xmlns="" val="1"/>
+              <ma14:wrappingTextBoxFlag xmlns="" xmlns:m="http://schemas.openxmlformats.org/officeDocument/2006/math" xmlns:a14="http://schemas.microsoft.com/office/drawing/2010/main" xmlns:ma14="http://schemas.microsoft.com/office/mac/drawingml/2011/main" val="1"/>
             </a:ext>
           </a:extLst>
         </p:spPr>
@@ -13578,7 +13579,7 @@
           </a:ln>
           <a:extLst>
             <a:ext uri="{C572A759-6A51-4108-AA02-DFA0A04FC94B}">
-              <ma14:wrappingTextBoxFlag xmlns:ma14="http://schemas.microsoft.com/office/mac/drawingml/2011/main" xmlns:a14="http://schemas.microsoft.com/office/drawing/2010/main" xmlns:m="http://schemas.openxmlformats.org/officeDocument/2006/math" xmlns="" val="1"/>
+              <ma14:wrappingTextBoxFlag xmlns="" xmlns:m="http://schemas.openxmlformats.org/officeDocument/2006/math" xmlns:a14="http://schemas.microsoft.com/office/drawing/2010/main" xmlns:ma14="http://schemas.microsoft.com/office/mac/drawingml/2011/main" val="1"/>
             </a:ext>
           </a:extLst>
         </p:spPr>
@@ -13623,7 +13624,7 @@
           </a:ln>
           <a:extLst>
             <a:ext uri="{C572A759-6A51-4108-AA02-DFA0A04FC94B}">
-              <ma14:wrappingTextBoxFlag xmlns:ma14="http://schemas.microsoft.com/office/mac/drawingml/2011/main" xmlns:a14="http://schemas.microsoft.com/office/drawing/2010/main" xmlns:m="http://schemas.openxmlformats.org/officeDocument/2006/math" xmlns="" val="1"/>
+              <ma14:wrappingTextBoxFlag xmlns="" xmlns:m="http://schemas.openxmlformats.org/officeDocument/2006/math" xmlns:a14="http://schemas.microsoft.com/office/drawing/2010/main" xmlns:ma14="http://schemas.microsoft.com/office/mac/drawingml/2011/main" val="1"/>
             </a:ext>
           </a:extLst>
         </p:spPr>
@@ -13901,7 +13902,7 @@
           </a:ln>
           <a:extLst>
             <a:ext uri="{C572A759-6A51-4108-AA02-DFA0A04FC94B}">
-              <ma14:wrappingTextBoxFlag xmlns:ma14="http://schemas.microsoft.com/office/mac/drawingml/2011/main" xmlns:a14="http://schemas.microsoft.com/office/drawing/2010/main" xmlns:m="http://schemas.openxmlformats.org/officeDocument/2006/math" xmlns="" val="1"/>
+              <ma14:wrappingTextBoxFlag xmlns="" xmlns:m="http://schemas.openxmlformats.org/officeDocument/2006/math" xmlns:a14="http://schemas.microsoft.com/office/drawing/2010/main" xmlns:ma14="http://schemas.microsoft.com/office/mac/drawingml/2011/main" val="1"/>
             </a:ext>
           </a:extLst>
         </p:spPr>
@@ -14082,7 +14083,7 @@
           </a:ln>
           <a:extLst>
             <a:ext uri="{C572A759-6A51-4108-AA02-DFA0A04FC94B}">
-              <ma14:wrappingTextBoxFlag xmlns:ma14="http://schemas.microsoft.com/office/mac/drawingml/2011/main" xmlns:a14="http://schemas.microsoft.com/office/drawing/2010/main" xmlns:m="http://schemas.openxmlformats.org/officeDocument/2006/math" xmlns="" val="1"/>
+              <ma14:wrappingTextBoxFlag xmlns="" xmlns:m="http://schemas.openxmlformats.org/officeDocument/2006/math" xmlns:a14="http://schemas.microsoft.com/office/drawing/2010/main" xmlns:ma14="http://schemas.microsoft.com/office/mac/drawingml/2011/main" val="1"/>
             </a:ext>
           </a:extLst>
         </p:spPr>
@@ -14482,7 +14483,7 @@
           </a:ln>
           <a:extLst>
             <a:ext uri="{C572A759-6A51-4108-AA02-DFA0A04FC94B}">
-              <ma14:wrappingTextBoxFlag xmlns:ma14="http://schemas.microsoft.com/office/mac/drawingml/2011/main" xmlns:a14="http://schemas.microsoft.com/office/drawing/2010/main" xmlns:m="http://schemas.openxmlformats.org/officeDocument/2006/math" xmlns="" val="1"/>
+              <ma14:wrappingTextBoxFlag xmlns="" xmlns:m="http://schemas.openxmlformats.org/officeDocument/2006/math" xmlns:a14="http://schemas.microsoft.com/office/drawing/2010/main" xmlns:ma14="http://schemas.microsoft.com/office/mac/drawingml/2011/main" val="1"/>
             </a:ext>
           </a:extLst>
         </p:spPr>
@@ -14547,7 +14548,7 @@
           </a:ln>
           <a:extLst>
             <a:ext uri="{C572A759-6A51-4108-AA02-DFA0A04FC94B}">
-              <ma14:wrappingTextBoxFlag xmlns:ma14="http://schemas.microsoft.com/office/mac/drawingml/2011/main" xmlns:a14="http://schemas.microsoft.com/office/drawing/2010/main" xmlns:m="http://schemas.openxmlformats.org/officeDocument/2006/math" xmlns="" val="1"/>
+              <ma14:wrappingTextBoxFlag xmlns="" xmlns:m="http://schemas.openxmlformats.org/officeDocument/2006/math" xmlns:a14="http://schemas.microsoft.com/office/drawing/2010/main" xmlns:ma14="http://schemas.microsoft.com/office/mac/drawingml/2011/main" val="1"/>
             </a:ext>
           </a:extLst>
         </p:spPr>
@@ -14620,7 +14621,7 @@
           </a:ln>
           <a:extLst>
             <a:ext uri="{C572A759-6A51-4108-AA02-DFA0A04FC94B}">
-              <ma14:wrappingTextBoxFlag xmlns:ma14="http://schemas.microsoft.com/office/mac/drawingml/2011/main" xmlns:a14="http://schemas.microsoft.com/office/drawing/2010/main" xmlns:m="http://schemas.openxmlformats.org/officeDocument/2006/math" xmlns="" val="1"/>
+              <ma14:wrappingTextBoxFlag xmlns="" xmlns:m="http://schemas.openxmlformats.org/officeDocument/2006/math" xmlns:a14="http://schemas.microsoft.com/office/drawing/2010/main" xmlns:ma14="http://schemas.microsoft.com/office/mac/drawingml/2011/main" val="1"/>
             </a:ext>
           </a:extLst>
         </p:spPr>
@@ -14968,8 +14969,8 @@
         </p:nvSpPr>
         <p:spPr>
           <a:xfrm>
-            <a:off x="11138321" y="9138024"/>
-            <a:ext cx="549325" cy="457201"/>
+            <a:off x="11284743" y="9130663"/>
+            <a:ext cx="256480" cy="471924"/>
           </a:xfrm>
           <a:prstGeom prst="rect">
             <a:avLst/>
@@ -14979,7 +14980,7 @@
           </a:ln>
           <a:extLst>
             <a:ext uri="{C572A759-6A51-4108-AA02-DFA0A04FC94B}">
-              <ma14:wrappingTextBoxFlag xmlns:ma14="http://schemas.microsoft.com/office/mac/drawingml/2011/main" xmlns:a14="http://schemas.microsoft.com/office/drawing/2010/main" xmlns:m="http://schemas.openxmlformats.org/officeDocument/2006/math" xmlns="" val="1"/>
+              <ma14:wrappingTextBoxFlag xmlns="" xmlns:m="http://schemas.openxmlformats.org/officeDocument/2006/math" xmlns:a14="http://schemas.microsoft.com/office/drawing/2010/main" xmlns:ma14="http://schemas.microsoft.com/office/mac/drawingml/2011/main" val="1"/>
             </a:ext>
           </a:extLst>
         </p:spPr>
@@ -14994,9 +14995,10 @@
           </a:lstStyle>
           <a:p>
             <a:r>
-              <a:rPr dirty="0"/>
-              <a:t>"hi"</a:t>
-            </a:r>
+              <a:rPr lang="en-US" dirty="0"/>
+              <a:t>3</a:t>
+            </a:r>
+            <a:endParaRPr dirty="0"/>
           </a:p>
         </p:txBody>
       </p:sp>
@@ -15090,7 +15092,7 @@
           </a:ln>
           <a:extLst>
             <a:ext uri="{C572A759-6A51-4108-AA02-DFA0A04FC94B}">
-              <ma14:wrappingTextBoxFlag xmlns:ma14="http://schemas.microsoft.com/office/mac/drawingml/2011/main" xmlns:a14="http://schemas.microsoft.com/office/drawing/2010/main" xmlns:m="http://schemas.openxmlformats.org/officeDocument/2006/math" xmlns="" val="1"/>
+              <ma14:wrappingTextBoxFlag xmlns="" xmlns:m="http://schemas.openxmlformats.org/officeDocument/2006/math" xmlns:a14="http://schemas.microsoft.com/office/drawing/2010/main" xmlns:ma14="http://schemas.microsoft.com/office/mac/drawingml/2011/main" val="1"/>
             </a:ext>
           </a:extLst>
         </p:spPr>
@@ -15141,7 +15143,7 @@
           </a:ln>
           <a:extLst>
             <a:ext uri="{C572A759-6A51-4108-AA02-DFA0A04FC94B}">
-              <ma14:wrappingTextBoxFlag xmlns:ma14="http://schemas.microsoft.com/office/mac/drawingml/2011/main" xmlns:a14="http://schemas.microsoft.com/office/drawing/2010/main" xmlns:m="http://schemas.openxmlformats.org/officeDocument/2006/math" xmlns="" val="1"/>
+              <ma14:wrappingTextBoxFlag xmlns="" xmlns:m="http://schemas.openxmlformats.org/officeDocument/2006/math" xmlns:a14="http://schemas.microsoft.com/office/drawing/2010/main" xmlns:ma14="http://schemas.microsoft.com/office/mac/drawingml/2011/main" val="1"/>
             </a:ext>
           </a:extLst>
         </p:spPr>
@@ -15192,7 +15194,7 @@
           </a:ln>
           <a:extLst>
             <a:ext uri="{C572A759-6A51-4108-AA02-DFA0A04FC94B}">
-              <ma14:wrappingTextBoxFlag xmlns:ma14="http://schemas.microsoft.com/office/mac/drawingml/2011/main" xmlns:a14="http://schemas.microsoft.com/office/drawing/2010/main" xmlns:m="http://schemas.openxmlformats.org/officeDocument/2006/math" xmlns="" val="1"/>
+              <ma14:wrappingTextBoxFlag xmlns="" xmlns:m="http://schemas.openxmlformats.org/officeDocument/2006/math" xmlns:a14="http://schemas.microsoft.com/office/drawing/2010/main" xmlns:ma14="http://schemas.microsoft.com/office/mac/drawingml/2011/main" val="1"/>
             </a:ext>
           </a:extLst>
         </p:spPr>
@@ -15238,7 +15240,7 @@
           </a:ln>
           <a:extLst>
             <a:ext uri="{C572A759-6A51-4108-AA02-DFA0A04FC94B}">
-              <ma14:wrappingTextBoxFlag xmlns:ma14="http://schemas.microsoft.com/office/mac/drawingml/2011/main" xmlns:a14="http://schemas.microsoft.com/office/drawing/2010/main" xmlns:m="http://schemas.openxmlformats.org/officeDocument/2006/math" xmlns="" val="1"/>
+              <ma14:wrappingTextBoxFlag xmlns="" xmlns:m="http://schemas.openxmlformats.org/officeDocument/2006/math" xmlns:a14="http://schemas.microsoft.com/office/drawing/2010/main" xmlns:ma14="http://schemas.microsoft.com/office/mac/drawingml/2011/main" val="1"/>
             </a:ext>
           </a:extLst>
         </p:spPr>
@@ -15284,7 +15286,7 @@
           </a:ln>
           <a:extLst>
             <a:ext uri="{C572A759-6A51-4108-AA02-DFA0A04FC94B}">
-              <ma14:wrappingTextBoxFlag xmlns:ma14="http://schemas.microsoft.com/office/mac/drawingml/2011/main" xmlns:a14="http://schemas.microsoft.com/office/drawing/2010/main" xmlns:m="http://schemas.openxmlformats.org/officeDocument/2006/math" xmlns="" val="1"/>
+              <ma14:wrappingTextBoxFlag xmlns="" xmlns:m="http://schemas.openxmlformats.org/officeDocument/2006/math" xmlns:a14="http://schemas.microsoft.com/office/drawing/2010/main" xmlns:ma14="http://schemas.microsoft.com/office/mac/drawingml/2011/main" val="1"/>
             </a:ext>
           </a:extLst>
         </p:spPr>
@@ -15330,7 +15332,7 @@
           </a:ln>
           <a:extLst>
             <a:ext uri="{C572A759-6A51-4108-AA02-DFA0A04FC94B}">
-              <ma14:wrappingTextBoxFlag xmlns:ma14="http://schemas.microsoft.com/office/mac/drawingml/2011/main" xmlns:a14="http://schemas.microsoft.com/office/drawing/2010/main" xmlns:m="http://schemas.openxmlformats.org/officeDocument/2006/math" xmlns="" val="1"/>
+              <ma14:wrappingTextBoxFlag xmlns="" xmlns:m="http://schemas.openxmlformats.org/officeDocument/2006/math" xmlns:a14="http://schemas.microsoft.com/office/drawing/2010/main" xmlns:ma14="http://schemas.microsoft.com/office/mac/drawingml/2011/main" val="1"/>
             </a:ext>
           </a:extLst>
         </p:spPr>
@@ -15376,7 +15378,7 @@
           </a:ln>
           <a:extLst>
             <a:ext uri="{C572A759-6A51-4108-AA02-DFA0A04FC94B}">
-              <ma14:wrappingTextBoxFlag xmlns:ma14="http://schemas.microsoft.com/office/mac/drawingml/2011/main" xmlns:a14="http://schemas.microsoft.com/office/drawing/2010/main" xmlns:m="http://schemas.openxmlformats.org/officeDocument/2006/math" xmlns="" val="1"/>
+              <ma14:wrappingTextBoxFlag xmlns="" xmlns:m="http://schemas.openxmlformats.org/officeDocument/2006/math" xmlns:a14="http://schemas.microsoft.com/office/drawing/2010/main" xmlns:ma14="http://schemas.microsoft.com/office/mac/drawingml/2011/main" val="1"/>
             </a:ext>
           </a:extLst>
         </p:spPr>
@@ -15547,7 +15549,7 @@
           </a:ln>
           <a:extLst>
             <a:ext uri="{C572A759-6A51-4108-AA02-DFA0A04FC94B}">
-              <ma14:wrappingTextBoxFlag xmlns:ma14="http://schemas.microsoft.com/office/mac/drawingml/2011/main" xmlns:a14="http://schemas.microsoft.com/office/drawing/2010/main" xmlns:m="http://schemas.openxmlformats.org/officeDocument/2006/math" xmlns="" val="1"/>
+              <ma14:wrappingTextBoxFlag xmlns="" xmlns:m="http://schemas.openxmlformats.org/officeDocument/2006/math" xmlns:a14="http://schemas.microsoft.com/office/drawing/2010/main" xmlns:ma14="http://schemas.microsoft.com/office/mac/drawingml/2011/main" val="1"/>
             </a:ext>
           </a:extLst>
         </p:spPr>
@@ -15734,7 +15736,7 @@
           </a:ln>
           <a:extLst>
             <a:ext uri="{C572A759-6A51-4108-AA02-DFA0A04FC94B}">
-              <ma14:wrappingTextBoxFlag xmlns:ma14="http://schemas.microsoft.com/office/mac/drawingml/2011/main" xmlns:a14="http://schemas.microsoft.com/office/drawing/2010/main" xmlns:m="http://schemas.openxmlformats.org/officeDocument/2006/math" xmlns="" val="1"/>
+              <ma14:wrappingTextBoxFlag xmlns="" xmlns:m="http://schemas.openxmlformats.org/officeDocument/2006/math" xmlns:a14="http://schemas.microsoft.com/office/drawing/2010/main" xmlns:ma14="http://schemas.microsoft.com/office/mac/drawingml/2011/main" val="1"/>
             </a:ext>
           </a:extLst>
         </p:spPr>
@@ -16160,7 +16162,7 @@
           </a:ln>
           <a:extLst>
             <a:ext uri="{C572A759-6A51-4108-AA02-DFA0A04FC94B}">
-              <ma14:wrappingTextBoxFlag xmlns:ma14="http://schemas.microsoft.com/office/mac/drawingml/2011/main" xmlns:a14="http://schemas.microsoft.com/office/drawing/2010/main" xmlns:m="http://schemas.openxmlformats.org/officeDocument/2006/math" xmlns="" val="1"/>
+              <ma14:wrappingTextBoxFlag xmlns="" xmlns:m="http://schemas.openxmlformats.org/officeDocument/2006/math" xmlns:a14="http://schemas.microsoft.com/office/drawing/2010/main" xmlns:ma14="http://schemas.microsoft.com/office/mac/drawingml/2011/main" val="1"/>
             </a:ext>
           </a:extLst>
         </p:spPr>
@@ -16347,7 +16349,7 @@
           </a:ln>
           <a:extLst>
             <a:ext uri="{C572A759-6A51-4108-AA02-DFA0A04FC94B}">
-              <ma14:wrappingTextBoxFlag xmlns:ma14="http://schemas.microsoft.com/office/mac/drawingml/2011/main" xmlns:a14="http://schemas.microsoft.com/office/drawing/2010/main" xmlns:m="http://schemas.openxmlformats.org/officeDocument/2006/math" xmlns="" val="1"/>
+              <ma14:wrappingTextBoxFlag xmlns="" xmlns:m="http://schemas.openxmlformats.org/officeDocument/2006/math" xmlns:a14="http://schemas.microsoft.com/office/drawing/2010/main" xmlns:ma14="http://schemas.microsoft.com/office/mac/drawingml/2011/main" val="1"/>
             </a:ext>
           </a:extLst>
         </p:spPr>
@@ -16571,7 +16573,7 @@
           </a:ln>
           <a:extLst>
             <a:ext uri="{C572A759-6A51-4108-AA02-DFA0A04FC94B}">
-              <ma14:wrappingTextBoxFlag xmlns:ma14="http://schemas.microsoft.com/office/mac/drawingml/2011/main" xmlns:a14="http://schemas.microsoft.com/office/drawing/2010/main" xmlns:m="http://schemas.openxmlformats.org/officeDocument/2006/math" xmlns="" val="1"/>
+              <ma14:wrappingTextBoxFlag xmlns="" xmlns:m="http://schemas.openxmlformats.org/officeDocument/2006/math" xmlns:a14="http://schemas.microsoft.com/office/drawing/2010/main" xmlns:ma14="http://schemas.microsoft.com/office/mac/drawingml/2011/main" val="1"/>
             </a:ext>
           </a:extLst>
         </p:spPr>
@@ -16997,7 +16999,7 @@
           </a:ln>
           <a:extLst>
             <a:ext uri="{C572A759-6A51-4108-AA02-DFA0A04FC94B}">
-              <ma14:wrappingTextBoxFlag xmlns:ma14="http://schemas.microsoft.com/office/mac/drawingml/2011/main" xmlns:a14="http://schemas.microsoft.com/office/drawing/2010/main" xmlns:m="http://schemas.openxmlformats.org/officeDocument/2006/math" xmlns="" val="1"/>
+              <ma14:wrappingTextBoxFlag xmlns="" xmlns:m="http://schemas.openxmlformats.org/officeDocument/2006/math" xmlns:a14="http://schemas.microsoft.com/office/drawing/2010/main" xmlns:ma14="http://schemas.microsoft.com/office/mac/drawingml/2011/main" val="1"/>
             </a:ext>
           </a:extLst>
         </p:spPr>
@@ -17184,7 +17186,7 @@
           </a:ln>
           <a:extLst>
             <a:ext uri="{C572A759-6A51-4108-AA02-DFA0A04FC94B}">
-              <ma14:wrappingTextBoxFlag xmlns:ma14="http://schemas.microsoft.com/office/mac/drawingml/2011/main" xmlns:a14="http://schemas.microsoft.com/office/drawing/2010/main" xmlns:m="http://schemas.openxmlformats.org/officeDocument/2006/math" xmlns="" val="1"/>
+              <ma14:wrappingTextBoxFlag xmlns="" xmlns:m="http://schemas.openxmlformats.org/officeDocument/2006/math" xmlns:a14="http://schemas.microsoft.com/office/drawing/2010/main" xmlns:ma14="http://schemas.microsoft.com/office/mac/drawingml/2011/main" val="1"/>
             </a:ext>
           </a:extLst>
         </p:spPr>
@@ -17408,7 +17410,7 @@
           </a:ln>
           <a:extLst>
             <a:ext uri="{C572A759-6A51-4108-AA02-DFA0A04FC94B}">
-              <ma14:wrappingTextBoxFlag xmlns:ma14="http://schemas.microsoft.com/office/mac/drawingml/2011/main" xmlns:a14="http://schemas.microsoft.com/office/drawing/2010/main" xmlns:m="http://schemas.openxmlformats.org/officeDocument/2006/math" xmlns="" val="1"/>
+              <ma14:wrappingTextBoxFlag xmlns="" xmlns:m="http://schemas.openxmlformats.org/officeDocument/2006/math" xmlns:a14="http://schemas.microsoft.com/office/drawing/2010/main" xmlns:ma14="http://schemas.microsoft.com/office/mac/drawingml/2011/main" val="1"/>
             </a:ext>
           </a:extLst>
         </p:spPr>
@@ -17567,7 +17569,7 @@
           </a:ln>
           <a:extLst>
             <a:ext uri="{C572A759-6A51-4108-AA02-DFA0A04FC94B}">
-              <ma14:wrappingTextBoxFlag xmlns:ma14="http://schemas.microsoft.com/office/mac/drawingml/2011/main" xmlns:a14="http://schemas.microsoft.com/office/drawing/2010/main" xmlns:m="http://schemas.openxmlformats.org/officeDocument/2006/math" xmlns="" val="1"/>
+              <ma14:wrappingTextBoxFlag xmlns="" xmlns:m="http://schemas.openxmlformats.org/officeDocument/2006/math" xmlns:a14="http://schemas.microsoft.com/office/drawing/2010/main" xmlns:ma14="http://schemas.microsoft.com/office/mac/drawingml/2011/main" val="1"/>
             </a:ext>
           </a:extLst>
         </p:spPr>
@@ -18064,7 +18066,7 @@
           </a:ln>
           <a:extLst>
             <a:ext uri="{C572A759-6A51-4108-AA02-DFA0A04FC94B}">
-              <ma14:wrappingTextBoxFlag xmlns:ma14="http://schemas.microsoft.com/office/mac/drawingml/2011/main" xmlns:a14="http://schemas.microsoft.com/office/drawing/2010/main" xmlns:m="http://schemas.openxmlformats.org/officeDocument/2006/math" xmlns="" val="1"/>
+              <ma14:wrappingTextBoxFlag xmlns="" xmlns:m="http://schemas.openxmlformats.org/officeDocument/2006/math" xmlns:a14="http://schemas.microsoft.com/office/drawing/2010/main" xmlns:ma14="http://schemas.microsoft.com/office/mac/drawingml/2011/main" val="1"/>
             </a:ext>
           </a:extLst>
         </p:spPr>
@@ -19621,7 +19623,7 @@
           </a:ln>
           <a:extLst>
             <a:ext uri="{C572A759-6A51-4108-AA02-DFA0A04FC94B}">
-              <ma14:wrappingTextBoxFlag xmlns:ma14="http://schemas.microsoft.com/office/mac/drawingml/2011/main" xmlns:a14="http://schemas.microsoft.com/office/drawing/2010/main" xmlns:m="http://schemas.openxmlformats.org/officeDocument/2006/math" xmlns="" val="1"/>
+              <ma14:wrappingTextBoxFlag xmlns="" xmlns:m="http://schemas.openxmlformats.org/officeDocument/2006/math" xmlns:a14="http://schemas.microsoft.com/office/drawing/2010/main" xmlns:ma14="http://schemas.microsoft.com/office/mac/drawingml/2011/main" val="1"/>
             </a:ext>
           </a:extLst>
         </p:spPr>
@@ -20524,7 +20526,7 @@
           </a:ln>
           <a:extLst>
             <a:ext uri="{C572A759-6A51-4108-AA02-DFA0A04FC94B}">
-              <ma14:wrappingTextBoxFlag xmlns:ma14="http://schemas.microsoft.com/office/mac/drawingml/2011/main" xmlns:a14="http://schemas.microsoft.com/office/drawing/2010/main" xmlns:m="http://schemas.openxmlformats.org/officeDocument/2006/math" xmlns="" val="1"/>
+              <ma14:wrappingTextBoxFlag xmlns="" xmlns:m="http://schemas.openxmlformats.org/officeDocument/2006/math" xmlns:a14="http://schemas.microsoft.com/office/drawing/2010/main" xmlns:ma14="http://schemas.microsoft.com/office/mac/drawingml/2011/main" val="1"/>
             </a:ext>
           </a:extLst>
         </p:spPr>
@@ -21411,7 +21413,7 @@
           </a:ln>
           <a:extLst>
             <a:ext uri="{C572A759-6A51-4108-AA02-DFA0A04FC94B}">
-              <ma14:wrappingTextBoxFlag xmlns:ma14="http://schemas.microsoft.com/office/mac/drawingml/2011/main" xmlns:a14="http://schemas.microsoft.com/office/drawing/2010/main" xmlns:m="http://schemas.openxmlformats.org/officeDocument/2006/math" xmlns="" val="1"/>
+              <ma14:wrappingTextBoxFlag xmlns="" xmlns:m="http://schemas.openxmlformats.org/officeDocument/2006/math" xmlns:a14="http://schemas.microsoft.com/office/drawing/2010/main" xmlns:ma14="http://schemas.microsoft.com/office/mac/drawingml/2011/main" val="1"/>
             </a:ext>
           </a:extLst>
         </p:spPr>
@@ -21473,7 +21475,7 @@
           </a:ln>
           <a:extLst>
             <a:ext uri="{C572A759-6A51-4108-AA02-DFA0A04FC94B}">
-              <ma14:wrappingTextBoxFlag xmlns:ma14="http://schemas.microsoft.com/office/mac/drawingml/2011/main" xmlns:a14="http://schemas.microsoft.com/office/drawing/2010/main" xmlns:m="http://schemas.openxmlformats.org/officeDocument/2006/math" xmlns="" val="1"/>
+              <ma14:wrappingTextBoxFlag xmlns="" xmlns:m="http://schemas.openxmlformats.org/officeDocument/2006/math" xmlns:a14="http://schemas.microsoft.com/office/drawing/2010/main" xmlns:ma14="http://schemas.microsoft.com/office/mac/drawingml/2011/main" val="1"/>
             </a:ext>
           </a:extLst>
         </p:spPr>
@@ -24705,7 +24707,7 @@
           </a:ln>
           <a:extLst>
             <a:ext uri="{C572A759-6A51-4108-AA02-DFA0A04FC94B}">
-              <ma14:wrappingTextBoxFlag xmlns:ma14="http://schemas.microsoft.com/office/mac/drawingml/2011/main" xmlns:a14="http://schemas.microsoft.com/office/drawing/2010/main" xmlns:m="http://schemas.openxmlformats.org/officeDocument/2006/math" xmlns="" val="1"/>
+              <ma14:wrappingTextBoxFlag xmlns="" xmlns:m="http://schemas.openxmlformats.org/officeDocument/2006/math" xmlns:a14="http://schemas.microsoft.com/office/drawing/2010/main" xmlns:ma14="http://schemas.microsoft.com/office/mac/drawingml/2011/main" val="1"/>
             </a:ext>
           </a:extLst>
         </p:spPr>
@@ -24817,7 +24819,7 @@
           </a:ln>
           <a:extLst>
             <a:ext uri="{C572A759-6A51-4108-AA02-DFA0A04FC94B}">
-              <ma14:wrappingTextBoxFlag xmlns:ma14="http://schemas.microsoft.com/office/mac/drawingml/2011/main" xmlns:a14="http://schemas.microsoft.com/office/drawing/2010/main" xmlns:m="http://schemas.openxmlformats.org/officeDocument/2006/math" xmlns="" val="1"/>
+              <ma14:wrappingTextBoxFlag xmlns="" xmlns:m="http://schemas.openxmlformats.org/officeDocument/2006/math" xmlns:a14="http://schemas.microsoft.com/office/drawing/2010/main" xmlns:ma14="http://schemas.microsoft.com/office/mac/drawingml/2011/main" val="1"/>
             </a:ext>
           </a:extLst>
         </p:spPr>
@@ -27263,7 +27265,7 @@
           </a:ln>
           <a:extLst>
             <a:ext uri="{C572A759-6A51-4108-AA02-DFA0A04FC94B}">
-              <ma14:wrappingTextBoxFlag xmlns:ma14="http://schemas.microsoft.com/office/mac/drawingml/2011/main" xmlns:a14="http://schemas.microsoft.com/office/drawing/2010/main" xmlns:m="http://schemas.openxmlformats.org/officeDocument/2006/math" xmlns="" val="1"/>
+              <ma14:wrappingTextBoxFlag xmlns="" xmlns:m="http://schemas.openxmlformats.org/officeDocument/2006/math" xmlns:a14="http://schemas.microsoft.com/office/drawing/2010/main" xmlns:ma14="http://schemas.microsoft.com/office/mac/drawingml/2011/main" val="1"/>
             </a:ext>
           </a:extLst>
         </p:spPr>
@@ -27320,7 +27322,7 @@
           </a:ln>
           <a:extLst>
             <a:ext uri="{C572A759-6A51-4108-AA02-DFA0A04FC94B}">
-              <ma14:wrappingTextBoxFlag xmlns:ma14="http://schemas.microsoft.com/office/mac/drawingml/2011/main" xmlns:a14="http://schemas.microsoft.com/office/drawing/2010/main" xmlns:m="http://schemas.openxmlformats.org/officeDocument/2006/math" xmlns="" val="1"/>
+              <ma14:wrappingTextBoxFlag xmlns="" xmlns:m="http://schemas.openxmlformats.org/officeDocument/2006/math" xmlns:a14="http://schemas.microsoft.com/office/drawing/2010/main" xmlns:ma14="http://schemas.microsoft.com/office/mac/drawingml/2011/main" val="1"/>
             </a:ext>
           </a:extLst>
         </p:spPr>
@@ -27787,7 +27789,7 @@
           </a:ln>
           <a:extLst>
             <a:ext uri="{C572A759-6A51-4108-AA02-DFA0A04FC94B}">
-              <ma14:wrappingTextBoxFlag xmlns:ma14="http://schemas.microsoft.com/office/mac/drawingml/2011/main" xmlns:a14="http://schemas.microsoft.com/office/drawing/2010/main" xmlns:m="http://schemas.openxmlformats.org/officeDocument/2006/math" xmlns="" val="1"/>
+              <ma14:wrappingTextBoxFlag xmlns="" xmlns:m="http://schemas.openxmlformats.org/officeDocument/2006/math" xmlns:a14="http://schemas.microsoft.com/office/drawing/2010/main" xmlns:ma14="http://schemas.microsoft.com/office/mac/drawingml/2011/main" val="1"/>
             </a:ext>
           </a:extLst>
         </p:spPr>
@@ -27822,7 +27824,7 @@
           </a:ln>
           <a:extLst>
             <a:ext uri="{C572A759-6A51-4108-AA02-DFA0A04FC94B}">
-              <ma14:wrappingTextBoxFlag xmlns:ma14="http://schemas.microsoft.com/office/mac/drawingml/2011/main" xmlns:a14="http://schemas.microsoft.com/office/drawing/2010/main" xmlns:m="http://schemas.openxmlformats.org/officeDocument/2006/math" xmlns="" val="1"/>
+              <ma14:wrappingTextBoxFlag xmlns="" xmlns:m="http://schemas.openxmlformats.org/officeDocument/2006/math" xmlns:a14="http://schemas.microsoft.com/office/drawing/2010/main" xmlns:ma14="http://schemas.microsoft.com/office/mac/drawingml/2011/main" val="1"/>
             </a:ext>
           </a:extLst>
         </p:spPr>
@@ -27869,7 +27871,7 @@
           </a:ln>
           <a:extLst>
             <a:ext uri="{C572A759-6A51-4108-AA02-DFA0A04FC94B}">
-              <ma14:wrappingTextBoxFlag xmlns:ma14="http://schemas.microsoft.com/office/mac/drawingml/2011/main" xmlns:a14="http://schemas.microsoft.com/office/drawing/2010/main" xmlns:m="http://schemas.openxmlformats.org/officeDocument/2006/math" xmlns="" val="1"/>
+              <ma14:wrappingTextBoxFlag xmlns="" xmlns:m="http://schemas.openxmlformats.org/officeDocument/2006/math" xmlns:a14="http://schemas.microsoft.com/office/drawing/2010/main" xmlns:ma14="http://schemas.microsoft.com/office/mac/drawingml/2011/main" val="1"/>
             </a:ext>
           </a:extLst>
         </p:spPr>
@@ -27922,7 +27924,7 @@
           </a:ln>
           <a:extLst>
             <a:ext uri="{C572A759-6A51-4108-AA02-DFA0A04FC94B}">
-              <ma14:wrappingTextBoxFlag xmlns:ma14="http://schemas.microsoft.com/office/mac/drawingml/2011/main" xmlns:a14="http://schemas.microsoft.com/office/drawing/2010/main" xmlns:m="http://schemas.openxmlformats.org/officeDocument/2006/math" xmlns="" val="1"/>
+              <ma14:wrappingTextBoxFlag xmlns="" xmlns:m="http://schemas.openxmlformats.org/officeDocument/2006/math" xmlns:a14="http://schemas.microsoft.com/office/drawing/2010/main" xmlns:ma14="http://schemas.microsoft.com/office/mac/drawingml/2011/main" val="1"/>
             </a:ext>
           </a:extLst>
         </p:spPr>
@@ -28391,7 +28393,7 @@
           </a:ln>
           <a:extLst>
             <a:ext uri="{C572A759-6A51-4108-AA02-DFA0A04FC94B}">
-              <ma14:wrappingTextBoxFlag xmlns:ma14="http://schemas.microsoft.com/office/mac/drawingml/2011/main" xmlns:a14="http://schemas.microsoft.com/office/drawing/2010/main" xmlns:m="http://schemas.openxmlformats.org/officeDocument/2006/math" xmlns="" val="1"/>
+              <ma14:wrappingTextBoxFlag xmlns="" xmlns:m="http://schemas.openxmlformats.org/officeDocument/2006/math" xmlns:a14="http://schemas.microsoft.com/office/drawing/2010/main" xmlns:ma14="http://schemas.microsoft.com/office/mac/drawingml/2011/main" val="1"/>
             </a:ext>
           </a:extLst>
         </p:spPr>
@@ -28426,7 +28428,7 @@
           </a:ln>
           <a:extLst>
             <a:ext uri="{C572A759-6A51-4108-AA02-DFA0A04FC94B}">
-              <ma14:wrappingTextBoxFlag xmlns:ma14="http://schemas.microsoft.com/office/mac/drawingml/2011/main" xmlns:a14="http://schemas.microsoft.com/office/drawing/2010/main" xmlns:m="http://schemas.openxmlformats.org/officeDocument/2006/math" xmlns="" val="1"/>
+              <ma14:wrappingTextBoxFlag xmlns="" xmlns:m="http://schemas.openxmlformats.org/officeDocument/2006/math" xmlns:a14="http://schemas.microsoft.com/office/drawing/2010/main" xmlns:ma14="http://schemas.microsoft.com/office/mac/drawingml/2011/main" val="1"/>
             </a:ext>
           </a:extLst>
         </p:spPr>
@@ -28473,7 +28475,7 @@
           </a:ln>
           <a:extLst>
             <a:ext uri="{C572A759-6A51-4108-AA02-DFA0A04FC94B}">
-              <ma14:wrappingTextBoxFlag xmlns:ma14="http://schemas.microsoft.com/office/mac/drawingml/2011/main" xmlns:a14="http://schemas.microsoft.com/office/drawing/2010/main" xmlns:m="http://schemas.openxmlformats.org/officeDocument/2006/math" xmlns="" val="1"/>
+              <ma14:wrappingTextBoxFlag xmlns="" xmlns:m="http://schemas.openxmlformats.org/officeDocument/2006/math" xmlns:a14="http://schemas.microsoft.com/office/drawing/2010/main" xmlns:ma14="http://schemas.microsoft.com/office/mac/drawingml/2011/main" val="1"/>
             </a:ext>
           </a:extLst>
         </p:spPr>
@@ -28567,7 +28569,7 @@
           </a:ln>
           <a:extLst>
             <a:ext uri="{C572A759-6A51-4108-AA02-DFA0A04FC94B}">
-              <ma14:wrappingTextBoxFlag xmlns:ma14="http://schemas.microsoft.com/office/mac/drawingml/2011/main" xmlns:a14="http://schemas.microsoft.com/office/drawing/2010/main" xmlns:m="http://schemas.openxmlformats.org/officeDocument/2006/math" xmlns="" val="1"/>
+              <ma14:wrappingTextBoxFlag xmlns="" xmlns:m="http://schemas.openxmlformats.org/officeDocument/2006/math" xmlns:a14="http://schemas.microsoft.com/office/drawing/2010/main" xmlns:ma14="http://schemas.microsoft.com/office/mac/drawingml/2011/main" val="1"/>
             </a:ext>
           </a:extLst>
         </p:spPr>
@@ -28652,7 +28654,7 @@
           </a:ln>
           <a:extLst>
             <a:ext uri="{C572A759-6A51-4108-AA02-DFA0A04FC94B}">
-              <ma14:wrappingTextBoxFlag xmlns:ma14="http://schemas.microsoft.com/office/mac/drawingml/2011/main" xmlns:a14="http://schemas.microsoft.com/office/drawing/2010/main" xmlns:m="http://schemas.openxmlformats.org/officeDocument/2006/math" xmlns="" val="1"/>
+              <ma14:wrappingTextBoxFlag xmlns="" xmlns:m="http://schemas.openxmlformats.org/officeDocument/2006/math" xmlns:a14="http://schemas.microsoft.com/office/drawing/2010/main" xmlns:ma14="http://schemas.microsoft.com/office/mac/drawingml/2011/main" val="1"/>
             </a:ext>
           </a:extLst>
         </p:spPr>
@@ -28697,7 +28699,7 @@
           </a:ln>
           <a:extLst>
             <a:ext uri="{C572A759-6A51-4108-AA02-DFA0A04FC94B}">
-              <ma14:wrappingTextBoxFlag xmlns:ma14="http://schemas.microsoft.com/office/mac/drawingml/2011/main" xmlns:a14="http://schemas.microsoft.com/office/drawing/2010/main" xmlns:m="http://schemas.openxmlformats.org/officeDocument/2006/math" xmlns="" val="1"/>
+              <ma14:wrappingTextBoxFlag xmlns="" xmlns:m="http://schemas.openxmlformats.org/officeDocument/2006/math" xmlns:a14="http://schemas.microsoft.com/office/drawing/2010/main" xmlns:ma14="http://schemas.microsoft.com/office/mac/drawingml/2011/main" val="1"/>
             </a:ext>
           </a:extLst>
         </p:spPr>
@@ -28742,7 +28744,7 @@
           </a:ln>
           <a:extLst>
             <a:ext uri="{C572A759-6A51-4108-AA02-DFA0A04FC94B}">
-              <ma14:wrappingTextBoxFlag xmlns:ma14="http://schemas.microsoft.com/office/mac/drawingml/2011/main" xmlns:a14="http://schemas.microsoft.com/office/drawing/2010/main" xmlns:m="http://schemas.openxmlformats.org/officeDocument/2006/math" xmlns="" val="1"/>
+              <ma14:wrappingTextBoxFlag xmlns="" xmlns:m="http://schemas.openxmlformats.org/officeDocument/2006/math" xmlns:a14="http://schemas.microsoft.com/office/drawing/2010/main" xmlns:ma14="http://schemas.microsoft.com/office/mac/drawingml/2011/main" val="1"/>
             </a:ext>
           </a:extLst>
         </p:spPr>
@@ -28849,7 +28851,7 @@
           </a:ln>
           <a:extLst>
             <a:ext uri="{C572A759-6A51-4108-AA02-DFA0A04FC94B}">
-              <ma14:wrappingTextBoxFlag xmlns:ma14="http://schemas.microsoft.com/office/mac/drawingml/2011/main" xmlns:a14="http://schemas.microsoft.com/office/drawing/2010/main" xmlns:m="http://schemas.openxmlformats.org/officeDocument/2006/math" xmlns="" val="1"/>
+              <ma14:wrappingTextBoxFlag xmlns="" xmlns:m="http://schemas.openxmlformats.org/officeDocument/2006/math" xmlns:a14="http://schemas.microsoft.com/office/drawing/2010/main" xmlns:ma14="http://schemas.microsoft.com/office/mac/drawingml/2011/main" val="1"/>
             </a:ext>
           </a:extLst>
         </p:spPr>
@@ -28914,7 +28916,7 @@
           </a:ln>
           <a:extLst>
             <a:ext uri="{C572A759-6A51-4108-AA02-DFA0A04FC94B}">
-              <ma14:wrappingTextBoxFlag xmlns:ma14="http://schemas.microsoft.com/office/mac/drawingml/2011/main" xmlns:a14="http://schemas.microsoft.com/office/drawing/2010/main" xmlns:m="http://schemas.openxmlformats.org/officeDocument/2006/math" xmlns="" val="1"/>
+              <ma14:wrappingTextBoxFlag xmlns="" xmlns:m="http://schemas.openxmlformats.org/officeDocument/2006/math" xmlns:a14="http://schemas.microsoft.com/office/drawing/2010/main" xmlns:ma14="http://schemas.microsoft.com/office/mac/drawingml/2011/main" val="1"/>
             </a:ext>
           </a:extLst>
         </p:spPr>
@@ -29383,7 +29385,7 @@
           </a:ln>
           <a:extLst>
             <a:ext uri="{C572A759-6A51-4108-AA02-DFA0A04FC94B}">
-              <ma14:wrappingTextBoxFlag xmlns:ma14="http://schemas.microsoft.com/office/mac/drawingml/2011/main" xmlns:a14="http://schemas.microsoft.com/office/drawing/2010/main" xmlns:m="http://schemas.openxmlformats.org/officeDocument/2006/math" xmlns="" val="1"/>
+              <ma14:wrappingTextBoxFlag xmlns="" xmlns:m="http://schemas.openxmlformats.org/officeDocument/2006/math" xmlns:a14="http://schemas.microsoft.com/office/drawing/2010/main" xmlns:ma14="http://schemas.microsoft.com/office/mac/drawingml/2011/main" val="1"/>
             </a:ext>
           </a:extLst>
         </p:spPr>
@@ -29418,7 +29420,7 @@
           </a:ln>
           <a:extLst>
             <a:ext uri="{C572A759-6A51-4108-AA02-DFA0A04FC94B}">
-              <ma14:wrappingTextBoxFlag xmlns:ma14="http://schemas.microsoft.com/office/mac/drawingml/2011/main" xmlns:a14="http://schemas.microsoft.com/office/drawing/2010/main" xmlns:m="http://schemas.openxmlformats.org/officeDocument/2006/math" xmlns="" val="1"/>
+              <ma14:wrappingTextBoxFlag xmlns="" xmlns:m="http://schemas.openxmlformats.org/officeDocument/2006/math" xmlns:a14="http://schemas.microsoft.com/office/drawing/2010/main" xmlns:ma14="http://schemas.microsoft.com/office/mac/drawingml/2011/main" val="1"/>
             </a:ext>
           </a:extLst>
         </p:spPr>
@@ -29465,7 +29467,7 @@
           </a:ln>
           <a:extLst>
             <a:ext uri="{C572A759-6A51-4108-AA02-DFA0A04FC94B}">
-              <ma14:wrappingTextBoxFlag xmlns:ma14="http://schemas.microsoft.com/office/mac/drawingml/2011/main" xmlns:a14="http://schemas.microsoft.com/office/drawing/2010/main" xmlns:m="http://schemas.openxmlformats.org/officeDocument/2006/math" xmlns="" val="1"/>
+              <ma14:wrappingTextBoxFlag xmlns="" xmlns:m="http://schemas.openxmlformats.org/officeDocument/2006/math" xmlns:a14="http://schemas.microsoft.com/office/drawing/2010/main" xmlns:ma14="http://schemas.microsoft.com/office/mac/drawingml/2011/main" val="1"/>
             </a:ext>
           </a:extLst>
         </p:spPr>
@@ -29599,7 +29601,7 @@
           </a:ln>
           <a:extLst>
             <a:ext uri="{C572A759-6A51-4108-AA02-DFA0A04FC94B}">
-              <ma14:wrappingTextBoxFlag xmlns:ma14="http://schemas.microsoft.com/office/mac/drawingml/2011/main" xmlns:a14="http://schemas.microsoft.com/office/drawing/2010/main" xmlns:m="http://schemas.openxmlformats.org/officeDocument/2006/math" xmlns="" val="1"/>
+              <ma14:wrappingTextBoxFlag xmlns="" xmlns:m="http://schemas.openxmlformats.org/officeDocument/2006/math" xmlns:a14="http://schemas.microsoft.com/office/drawing/2010/main" xmlns:ma14="http://schemas.microsoft.com/office/mac/drawingml/2011/main" val="1"/>
             </a:ext>
           </a:extLst>
         </p:spPr>
@@ -29644,7 +29646,7 @@
           </a:ln>
           <a:extLst>
             <a:ext uri="{C572A759-6A51-4108-AA02-DFA0A04FC94B}">
-              <ma14:wrappingTextBoxFlag xmlns:ma14="http://schemas.microsoft.com/office/mac/drawingml/2011/main" xmlns:a14="http://schemas.microsoft.com/office/drawing/2010/main" xmlns:m="http://schemas.openxmlformats.org/officeDocument/2006/math" xmlns="" val="1"/>
+              <ma14:wrappingTextBoxFlag xmlns="" xmlns:m="http://schemas.openxmlformats.org/officeDocument/2006/math" xmlns:a14="http://schemas.microsoft.com/office/drawing/2010/main" xmlns:ma14="http://schemas.microsoft.com/office/mac/drawingml/2011/main" val="1"/>
             </a:ext>
           </a:extLst>
         </p:spPr>
@@ -29689,7 +29691,7 @@
           </a:ln>
           <a:extLst>
             <a:ext uri="{C572A759-6A51-4108-AA02-DFA0A04FC94B}">
-              <ma14:wrappingTextBoxFlag xmlns:ma14="http://schemas.microsoft.com/office/mac/drawingml/2011/main" xmlns:a14="http://schemas.microsoft.com/office/drawing/2010/main" xmlns:m="http://schemas.openxmlformats.org/officeDocument/2006/math" xmlns="" val="1"/>
+              <ma14:wrappingTextBoxFlag xmlns="" xmlns:m="http://schemas.openxmlformats.org/officeDocument/2006/math" xmlns:a14="http://schemas.microsoft.com/office/drawing/2010/main" xmlns:ma14="http://schemas.microsoft.com/office/mac/drawingml/2011/main" val="1"/>
             </a:ext>
           </a:extLst>
         </p:spPr>
@@ -29796,7 +29798,7 @@
           </a:ln>
           <a:extLst>
             <a:ext uri="{C572A759-6A51-4108-AA02-DFA0A04FC94B}">
-              <ma14:wrappingTextBoxFlag xmlns:ma14="http://schemas.microsoft.com/office/mac/drawingml/2011/main" xmlns:a14="http://schemas.microsoft.com/office/drawing/2010/main" xmlns:m="http://schemas.openxmlformats.org/officeDocument/2006/math" xmlns="" val="1"/>
+              <ma14:wrappingTextBoxFlag xmlns="" xmlns:m="http://schemas.openxmlformats.org/officeDocument/2006/math" xmlns:a14="http://schemas.microsoft.com/office/drawing/2010/main" xmlns:ma14="http://schemas.microsoft.com/office/mac/drawingml/2011/main" val="1"/>
             </a:ext>
           </a:extLst>
         </p:spPr>
@@ -29847,7 +29849,7 @@
           </a:ln>
           <a:extLst>
             <a:ext uri="{C572A759-6A51-4108-AA02-DFA0A04FC94B}">
-              <ma14:wrappingTextBoxFlag xmlns:ma14="http://schemas.microsoft.com/office/mac/drawingml/2011/main" xmlns:a14="http://schemas.microsoft.com/office/drawing/2010/main" xmlns:m="http://schemas.openxmlformats.org/officeDocument/2006/math" xmlns="" val="1"/>
+              <ma14:wrappingTextBoxFlag xmlns="" xmlns:m="http://schemas.openxmlformats.org/officeDocument/2006/math" xmlns:a14="http://schemas.microsoft.com/office/drawing/2010/main" xmlns:ma14="http://schemas.microsoft.com/office/mac/drawingml/2011/main" val="1"/>
             </a:ext>
           </a:extLst>
         </p:spPr>
@@ -29912,7 +29914,7 @@
           </a:ln>
           <a:extLst>
             <a:ext uri="{C572A759-6A51-4108-AA02-DFA0A04FC94B}">
-              <ma14:wrappingTextBoxFlag xmlns:ma14="http://schemas.microsoft.com/office/mac/drawingml/2011/main" xmlns:a14="http://schemas.microsoft.com/office/drawing/2010/main" xmlns:m="http://schemas.openxmlformats.org/officeDocument/2006/math" xmlns="" val="1"/>
+              <ma14:wrappingTextBoxFlag xmlns="" xmlns:m="http://schemas.openxmlformats.org/officeDocument/2006/math" xmlns:a14="http://schemas.microsoft.com/office/drawing/2010/main" xmlns:ma14="http://schemas.microsoft.com/office/mac/drawingml/2011/main" val="1"/>
             </a:ext>
           </a:extLst>
         </p:spPr>
@@ -30381,7 +30383,7 @@
           </a:ln>
           <a:extLst>
             <a:ext uri="{C572A759-6A51-4108-AA02-DFA0A04FC94B}">
-              <ma14:wrappingTextBoxFlag xmlns:ma14="http://schemas.microsoft.com/office/mac/drawingml/2011/main" xmlns:a14="http://schemas.microsoft.com/office/drawing/2010/main" xmlns:m="http://schemas.openxmlformats.org/officeDocument/2006/math" xmlns="" val="1"/>
+              <ma14:wrappingTextBoxFlag xmlns="" xmlns:m="http://schemas.openxmlformats.org/officeDocument/2006/math" xmlns:a14="http://schemas.microsoft.com/office/drawing/2010/main" xmlns:ma14="http://schemas.microsoft.com/office/mac/drawingml/2011/main" val="1"/>
             </a:ext>
           </a:extLst>
         </p:spPr>
@@ -30416,7 +30418,7 @@
           </a:ln>
           <a:extLst>
             <a:ext uri="{C572A759-6A51-4108-AA02-DFA0A04FC94B}">
-              <ma14:wrappingTextBoxFlag xmlns:ma14="http://schemas.microsoft.com/office/mac/drawingml/2011/main" xmlns:a14="http://schemas.microsoft.com/office/drawing/2010/main" xmlns:m="http://schemas.openxmlformats.org/officeDocument/2006/math" xmlns="" val="1"/>
+              <ma14:wrappingTextBoxFlag xmlns="" xmlns:m="http://schemas.openxmlformats.org/officeDocument/2006/math" xmlns:a14="http://schemas.microsoft.com/office/drawing/2010/main" xmlns:ma14="http://schemas.microsoft.com/office/mac/drawingml/2011/main" val="1"/>
             </a:ext>
           </a:extLst>
         </p:spPr>
@@ -30463,7 +30465,7 @@
           </a:ln>
           <a:extLst>
             <a:ext uri="{C572A759-6A51-4108-AA02-DFA0A04FC94B}">
-              <ma14:wrappingTextBoxFlag xmlns:ma14="http://schemas.microsoft.com/office/mac/drawingml/2011/main" xmlns:a14="http://schemas.microsoft.com/office/drawing/2010/main" xmlns:m="http://schemas.openxmlformats.org/officeDocument/2006/math" xmlns="" val="1"/>
+              <ma14:wrappingTextBoxFlag xmlns="" xmlns:m="http://schemas.openxmlformats.org/officeDocument/2006/math" xmlns:a14="http://schemas.microsoft.com/office/drawing/2010/main" xmlns:ma14="http://schemas.microsoft.com/office/mac/drawingml/2011/main" val="1"/>
             </a:ext>
           </a:extLst>
         </p:spPr>
@@ -30634,7 +30636,7 @@
           </a:ln>
           <a:extLst>
             <a:ext uri="{C572A759-6A51-4108-AA02-DFA0A04FC94B}">
-              <ma14:wrappingTextBoxFlag xmlns:ma14="http://schemas.microsoft.com/office/mac/drawingml/2011/main" xmlns:a14="http://schemas.microsoft.com/office/drawing/2010/main" xmlns:m="http://schemas.openxmlformats.org/officeDocument/2006/math" xmlns="" val="1"/>
+              <ma14:wrappingTextBoxFlag xmlns="" xmlns:m="http://schemas.openxmlformats.org/officeDocument/2006/math" xmlns:a14="http://schemas.microsoft.com/office/drawing/2010/main" xmlns:ma14="http://schemas.microsoft.com/office/mac/drawingml/2011/main" val="1"/>
             </a:ext>
           </a:extLst>
         </p:spPr>
@@ -30679,7 +30681,7 @@
           </a:ln>
           <a:extLst>
             <a:ext uri="{C572A759-6A51-4108-AA02-DFA0A04FC94B}">
-              <ma14:wrappingTextBoxFlag xmlns:ma14="http://schemas.microsoft.com/office/mac/drawingml/2011/main" xmlns:a14="http://schemas.microsoft.com/office/drawing/2010/main" xmlns:m="http://schemas.openxmlformats.org/officeDocument/2006/math" xmlns="" val="1"/>
+              <ma14:wrappingTextBoxFlag xmlns="" xmlns:m="http://schemas.openxmlformats.org/officeDocument/2006/math" xmlns:a14="http://schemas.microsoft.com/office/drawing/2010/main" xmlns:ma14="http://schemas.microsoft.com/office/mac/drawingml/2011/main" val="1"/>
             </a:ext>
           </a:extLst>
         </p:spPr>
@@ -30724,7 +30726,7 @@
           </a:ln>
           <a:extLst>
             <a:ext uri="{C572A759-6A51-4108-AA02-DFA0A04FC94B}">
-              <ma14:wrappingTextBoxFlag xmlns:ma14="http://schemas.microsoft.com/office/mac/drawingml/2011/main" xmlns:a14="http://schemas.microsoft.com/office/drawing/2010/main" xmlns:m="http://schemas.openxmlformats.org/officeDocument/2006/math" xmlns="" val="1"/>
+              <ma14:wrappingTextBoxFlag xmlns="" xmlns:m="http://schemas.openxmlformats.org/officeDocument/2006/math" xmlns:a14="http://schemas.microsoft.com/office/drawing/2010/main" xmlns:ma14="http://schemas.microsoft.com/office/mac/drawingml/2011/main" val="1"/>
             </a:ext>
           </a:extLst>
         </p:spPr>
@@ -30890,7 +30892,7 @@
           </a:ln>
           <a:extLst>
             <a:ext uri="{C572A759-6A51-4108-AA02-DFA0A04FC94B}">
-              <ma14:wrappingTextBoxFlag xmlns:ma14="http://schemas.microsoft.com/office/mac/drawingml/2011/main" xmlns:a14="http://schemas.microsoft.com/office/drawing/2010/main" xmlns:m="http://schemas.openxmlformats.org/officeDocument/2006/math" xmlns="" val="1"/>
+              <ma14:wrappingTextBoxFlag xmlns="" xmlns:m="http://schemas.openxmlformats.org/officeDocument/2006/math" xmlns:a14="http://schemas.microsoft.com/office/drawing/2010/main" xmlns:ma14="http://schemas.microsoft.com/office/mac/drawingml/2011/main" val="1"/>
             </a:ext>
           </a:extLst>
         </p:spPr>
@@ -30941,7 +30943,7 @@
           </a:ln>
           <a:extLst>
             <a:ext uri="{C572A759-6A51-4108-AA02-DFA0A04FC94B}">
-              <ma14:wrappingTextBoxFlag xmlns:ma14="http://schemas.microsoft.com/office/mac/drawingml/2011/main" xmlns:a14="http://schemas.microsoft.com/office/drawing/2010/main" xmlns:m="http://schemas.openxmlformats.org/officeDocument/2006/math" xmlns="" val="1"/>
+              <ma14:wrappingTextBoxFlag xmlns="" xmlns:m="http://schemas.openxmlformats.org/officeDocument/2006/math" xmlns:a14="http://schemas.microsoft.com/office/drawing/2010/main" xmlns:ma14="http://schemas.microsoft.com/office/mac/drawingml/2011/main" val="1"/>
             </a:ext>
           </a:extLst>
         </p:spPr>
@@ -30992,7 +30994,7 @@
           </a:ln>
           <a:extLst>
             <a:ext uri="{C572A759-6A51-4108-AA02-DFA0A04FC94B}">
-              <ma14:wrappingTextBoxFlag xmlns:ma14="http://schemas.microsoft.com/office/mac/drawingml/2011/main" xmlns:a14="http://schemas.microsoft.com/office/drawing/2010/main" xmlns:m="http://schemas.openxmlformats.org/officeDocument/2006/math" xmlns="" val="1"/>
+              <ma14:wrappingTextBoxFlag xmlns="" xmlns:m="http://schemas.openxmlformats.org/officeDocument/2006/math" xmlns:a14="http://schemas.microsoft.com/office/drawing/2010/main" xmlns:ma14="http://schemas.microsoft.com/office/mac/drawingml/2011/main" val="1"/>
             </a:ext>
           </a:extLst>
         </p:spPr>
@@ -31057,7 +31059,7 @@
           </a:ln>
           <a:extLst>
             <a:ext uri="{C572A759-6A51-4108-AA02-DFA0A04FC94B}">
-              <ma14:wrappingTextBoxFlag xmlns:ma14="http://schemas.microsoft.com/office/mac/drawingml/2011/main" xmlns:a14="http://schemas.microsoft.com/office/drawing/2010/main" xmlns:m="http://schemas.openxmlformats.org/officeDocument/2006/math" xmlns="" val="1"/>
+              <ma14:wrappingTextBoxFlag xmlns="" xmlns:m="http://schemas.openxmlformats.org/officeDocument/2006/math" xmlns:a14="http://schemas.microsoft.com/office/drawing/2010/main" xmlns:ma14="http://schemas.microsoft.com/office/mac/drawingml/2011/main" val="1"/>
             </a:ext>
           </a:extLst>
         </p:spPr>
@@ -31457,7 +31459,7 @@
           </a:ln>
           <a:extLst>
             <a:ext uri="{C572A759-6A51-4108-AA02-DFA0A04FC94B}">
-              <ma14:wrappingTextBoxFlag xmlns:ma14="http://schemas.microsoft.com/office/mac/drawingml/2011/main" xmlns:a14="http://schemas.microsoft.com/office/drawing/2010/main" xmlns:m="http://schemas.openxmlformats.org/officeDocument/2006/math" xmlns="" val="1"/>
+              <ma14:wrappingTextBoxFlag xmlns="" xmlns:m="http://schemas.openxmlformats.org/officeDocument/2006/math" xmlns:a14="http://schemas.microsoft.com/office/drawing/2010/main" xmlns:ma14="http://schemas.microsoft.com/office/mac/drawingml/2011/main" val="1"/>
             </a:ext>
           </a:extLst>
         </p:spPr>

</xml_diff>